<commit_message>
Update Anwender,Admindoku und Praesi
</commit_message>
<xml_diff>
--- a/Präsentation/DezHex.pptx
+++ b/Präsentation/DezHex.pptx
@@ -10,9 +10,10 @@
     <p:sldId id="263" r:id="rId4"/>
     <p:sldId id="258" r:id="rId5"/>
     <p:sldId id="259" r:id="rId6"/>
-    <p:sldId id="260" r:id="rId7"/>
-    <p:sldId id="261" r:id="rId8"/>
-    <p:sldId id="264" r:id="rId9"/>
+    <p:sldId id="265" r:id="rId7"/>
+    <p:sldId id="260" r:id="rId8"/>
+    <p:sldId id="261" r:id="rId9"/>
+    <p:sldId id="264" r:id="rId10"/>
   </p:sldIdLst>
   <p:sldSz cx="12192000" cy="6858000"/>
   <p:notesSz cx="6858000" cy="9144000"/>
@@ -4047,7 +4048,7 @@
         <p:spPr>
           <a:xfrm>
             <a:off x="866607" y="201371"/>
-            <a:ext cx="7564276" cy="690024"/>
+            <a:ext cx="4878238" cy="690024"/>
           </a:xfrm>
         </p:spPr>
         <p:txBody>
@@ -4058,7 +4059,7 @@
           <a:p>
             <a:r>
               <a:rPr lang="de-DE" dirty="0"/>
-              <a:t>Verwendete SWT - Werkezeuge</a:t>
+              <a:t>Dokumentationen</a:t>
             </a:r>
           </a:p>
         </p:txBody>
@@ -4083,7 +4084,67 @@
           <a:bodyPr/>
           <a:lstStyle/>
           <a:p>
+            <a:r>
+              <a:rPr lang="de-DE" dirty="0"/>
+              <a:t>Administratorendokumentation:</a:t>
+            </a:r>
+          </a:p>
+          <a:p>
+            <a:pPr lvl="1"/>
+            <a:r>
+              <a:rPr lang="de-DE" dirty="0"/>
+              <a:t>Wenige Systemvoraussetzungen (Windows, Java 8 oder höher)</a:t>
+            </a:r>
+          </a:p>
+          <a:p>
+            <a:pPr lvl="1"/>
+            <a:r>
+              <a:rPr lang="de-DE" dirty="0"/>
+              <a:t>Verknüpfung oder Ablage der exe-Datei auf dem Desktop</a:t>
+            </a:r>
+          </a:p>
+          <a:p>
+            <a:pPr marL="0" indent="0">
+              <a:buNone/>
+            </a:pPr>
             <a:endParaRPr lang="de-DE" dirty="0"/>
+          </a:p>
+          <a:p>
+            <a:r>
+              <a:rPr lang="de-DE" dirty="0"/>
+              <a:t>Anwenderdokumentation:</a:t>
+            </a:r>
+          </a:p>
+          <a:p>
+            <a:pPr lvl="1"/>
+            <a:r>
+              <a:rPr lang="de-DE" dirty="0"/>
+              <a:t>Kinder als Nutzer </a:t>
+            </a:r>
+            <a:r>
+              <a:rPr lang="de-DE" dirty="0">
+                <a:sym typeface="Wingdings" panose="05000000000000000000" pitchFamily="2" charset="2"/>
+              </a:rPr>
+              <a:t> entsprechend kinderfreundlich gestaltet</a:t>
+            </a:r>
+          </a:p>
+          <a:p>
+            <a:pPr lvl="1"/>
+            <a:r>
+              <a:rPr lang="de-DE"/>
+              <a:t>Detaillierte </a:t>
+            </a:r>
+            <a:r>
+              <a:rPr lang="de-DE" dirty="0"/>
+              <a:t>Anleitung</a:t>
+            </a:r>
+          </a:p>
+          <a:p>
+            <a:pPr lvl="1"/>
+            <a:r>
+              <a:rPr lang="de-DE" dirty="0"/>
+              <a:t>Kleine Übungsbeispiele mit Lösungen</a:t>
+            </a:r>
           </a:p>
         </p:txBody>
       </p:sp>
@@ -4181,7 +4242,7 @@
     </p:spTree>
     <p:extLst>
       <p:ext uri="{BB962C8B-B14F-4D97-AF65-F5344CB8AC3E}">
-        <p14:creationId xmlns:p14="http://schemas.microsoft.com/office/powerpoint/2010/main" val="3592684440"/>
+        <p14:creationId xmlns:p14="http://schemas.microsoft.com/office/powerpoint/2010/main" val="329994621"/>
       </p:ext>
     </p:extLst>
   </p:cSld>
@@ -4221,7 +4282,7 @@
         <p:spPr>
           <a:xfrm>
             <a:off x="866607" y="201371"/>
-            <a:ext cx="6126540" cy="690024"/>
+            <a:ext cx="7564276" cy="690024"/>
           </a:xfrm>
         </p:spPr>
         <p:txBody>
@@ -4232,7 +4293,7 @@
           <a:p>
             <a:r>
               <a:rPr lang="de-DE" dirty="0"/>
-              <a:t>Drittanbieter - Software</a:t>
+              <a:t>Verwendete SWT - Werkezeuge</a:t>
             </a:r>
           </a:p>
         </p:txBody>
@@ -4355,6 +4416,180 @@
     </p:spTree>
     <p:extLst>
       <p:ext uri="{BB962C8B-B14F-4D97-AF65-F5344CB8AC3E}">
+        <p14:creationId xmlns:p14="http://schemas.microsoft.com/office/powerpoint/2010/main" val="3592684440"/>
+      </p:ext>
+    </p:extLst>
+  </p:cSld>
+  <p:clrMapOvr>
+    <a:masterClrMapping/>
+  </p:clrMapOvr>
+</p:sld>
+</file>
+
+<file path=ppt/slides/slide8.xml><?xml version="1.0" encoding="utf-8"?>
+<p:sld xmlns:a="http://schemas.openxmlformats.org/drawingml/2006/main" xmlns:r="http://schemas.openxmlformats.org/officeDocument/2006/relationships" xmlns:p="http://schemas.openxmlformats.org/presentationml/2006/main">
+  <p:cSld>
+    <p:spTree>
+      <p:nvGrpSpPr>
+        <p:cNvPr id="1" name=""/>
+        <p:cNvGrpSpPr/>
+        <p:nvPr/>
+      </p:nvGrpSpPr>
+      <p:grpSpPr>
+        <a:xfrm>
+          <a:off x="0" y="0"/>
+          <a:ext cx="0" cy="0"/>
+          <a:chOff x="0" y="0"/>
+          <a:chExt cx="0" cy="0"/>
+        </a:xfrm>
+      </p:grpSpPr>
+      <p:sp>
+        <p:nvSpPr>
+          <p:cNvPr id="2" name="Titel 1"/>
+          <p:cNvSpPr>
+            <a:spLocks noGrp="1"/>
+          </p:cNvSpPr>
+          <p:nvPr>
+            <p:ph type="title"/>
+          </p:nvPr>
+        </p:nvSpPr>
+        <p:spPr>
+          <a:xfrm>
+            <a:off x="866607" y="201371"/>
+            <a:ext cx="6126540" cy="690024"/>
+          </a:xfrm>
+        </p:spPr>
+        <p:txBody>
+          <a:bodyPr>
+            <a:normAutofit fontScale="90000"/>
+          </a:bodyPr>
+          <a:lstStyle/>
+          <a:p>
+            <a:r>
+              <a:rPr lang="de-DE" dirty="0"/>
+              <a:t>Drittanbieter - Software</a:t>
+            </a:r>
+          </a:p>
+        </p:txBody>
+      </p:sp>
+      <p:sp>
+        <p:nvSpPr>
+          <p:cNvPr id="3" name="Inhaltsplatzhalter 2"/>
+          <p:cNvSpPr>
+            <a:spLocks noGrp="1"/>
+          </p:cNvSpPr>
+          <p:nvPr>
+            <p:ph idx="1"/>
+          </p:nvPr>
+        </p:nvSpPr>
+        <p:spPr>
+          <a:xfrm>
+            <a:off x="866607" y="1244780"/>
+            <a:ext cx="10515600" cy="4351338"/>
+          </a:xfrm>
+        </p:spPr>
+        <p:txBody>
+          <a:bodyPr/>
+          <a:lstStyle/>
+          <a:p>
+            <a:endParaRPr lang="de-DE" dirty="0"/>
+          </a:p>
+        </p:txBody>
+      </p:sp>
+      <p:pic>
+        <p:nvPicPr>
+          <p:cNvPr id="4" name="Grafik 3"/>
+          <p:cNvPicPr>
+            <a:picLocks noChangeAspect="1"/>
+          </p:cNvPicPr>
+          <p:nvPr/>
+        </p:nvPicPr>
+        <p:blipFill>
+          <a:blip r:embed="rId2" cstate="print">
+            <a:extLst>
+              <a:ext uri="{28A0092B-C50C-407E-A947-70E740481C1C}">
+                <a14:useLocalDpi xmlns:a14="http://schemas.microsoft.com/office/drawing/2010/main" val="0"/>
+              </a:ext>
+            </a:extLst>
+          </a:blip>
+          <a:stretch>
+            <a:fillRect/>
+          </a:stretch>
+        </p:blipFill>
+        <p:spPr>
+          <a:xfrm>
+            <a:off x="17595" y="3325"/>
+            <a:ext cx="849012" cy="851140"/>
+          </a:xfrm>
+          <a:prstGeom prst="rect">
+            <a:avLst/>
+          </a:prstGeom>
+          <a:effectLst/>
+        </p:spPr>
+      </p:pic>
+      <p:cxnSp>
+        <p:nvCxnSpPr>
+          <p:cNvPr id="5" name="Gerader Verbinder 4"/>
+          <p:cNvCxnSpPr/>
+          <p:nvPr/>
+        </p:nvCxnSpPr>
+        <p:spPr>
+          <a:xfrm>
+            <a:off x="0" y="879893"/>
+            <a:ext cx="10668000" cy="0"/>
+          </a:xfrm>
+          <a:prstGeom prst="line">
+            <a:avLst/>
+          </a:prstGeom>
+        </p:spPr>
+        <p:style>
+          <a:lnRef idx="3">
+            <a:schemeClr val="accent2"/>
+          </a:lnRef>
+          <a:fillRef idx="0">
+            <a:schemeClr val="accent2"/>
+          </a:fillRef>
+          <a:effectRef idx="2">
+            <a:schemeClr val="accent2"/>
+          </a:effectRef>
+          <a:fontRef idx="minor">
+            <a:schemeClr val="tx1"/>
+          </a:fontRef>
+        </p:style>
+      </p:cxnSp>
+      <p:cxnSp>
+        <p:nvCxnSpPr>
+          <p:cNvPr id="6" name="Gerader Verbinder 5"/>
+          <p:cNvCxnSpPr/>
+          <p:nvPr/>
+        </p:nvCxnSpPr>
+        <p:spPr>
+          <a:xfrm>
+            <a:off x="1524000" y="6311660"/>
+            <a:ext cx="10668000" cy="0"/>
+          </a:xfrm>
+          <a:prstGeom prst="line">
+            <a:avLst/>
+          </a:prstGeom>
+        </p:spPr>
+        <p:style>
+          <a:lnRef idx="3">
+            <a:schemeClr val="accent2"/>
+          </a:lnRef>
+          <a:fillRef idx="0">
+            <a:schemeClr val="accent2"/>
+          </a:fillRef>
+          <a:effectRef idx="2">
+            <a:schemeClr val="accent2"/>
+          </a:effectRef>
+          <a:fontRef idx="minor">
+            <a:schemeClr val="tx1"/>
+          </a:fontRef>
+        </p:style>
+      </p:cxnSp>
+    </p:spTree>
+    <p:extLst>
+      <p:ext uri="{BB962C8B-B14F-4D97-AF65-F5344CB8AC3E}">
         <p14:creationId xmlns:p14="http://schemas.microsoft.com/office/powerpoint/2010/main" val="1925289598"/>
       </p:ext>
     </p:extLst>
@@ -4365,7 +4600,7 @@
 </p:sld>
 </file>
 
-<file path=ppt/slides/slide8.xml><?xml version="1.0" encoding="utf-8"?>
+<file path=ppt/slides/slide9.xml><?xml version="1.0" encoding="utf-8"?>
 <p:sld xmlns:a="http://schemas.openxmlformats.org/drawingml/2006/main" xmlns:r="http://schemas.openxmlformats.org/officeDocument/2006/relationships" xmlns:p="http://schemas.openxmlformats.org/presentationml/2006/main">
   <p:cSld>
     <p:spTree>

</xml_diff>

<commit_message>
Anpassung der Präsentation/einfügen neuer Folien
</commit_message>
<xml_diff>
--- a/Präsentation/DezHex.pptx
+++ b/Präsentation/DezHex.pptx
@@ -9,11 +9,27 @@
     <p:sldId id="257" r:id="rId3"/>
     <p:sldId id="263" r:id="rId4"/>
     <p:sldId id="258" r:id="rId5"/>
-    <p:sldId id="259" r:id="rId6"/>
-    <p:sldId id="265" r:id="rId7"/>
-    <p:sldId id="260" r:id="rId8"/>
-    <p:sldId id="261" r:id="rId9"/>
-    <p:sldId id="264" r:id="rId10"/>
+    <p:sldId id="281" r:id="rId6"/>
+    <p:sldId id="282" r:id="rId7"/>
+    <p:sldId id="283" r:id="rId8"/>
+    <p:sldId id="284" r:id="rId9"/>
+    <p:sldId id="259" r:id="rId10"/>
+    <p:sldId id="285" r:id="rId11"/>
+    <p:sldId id="271" r:id="rId12"/>
+    <p:sldId id="272" r:id="rId13"/>
+    <p:sldId id="273" r:id="rId14"/>
+    <p:sldId id="260" r:id="rId15"/>
+    <p:sldId id="287" r:id="rId16"/>
+    <p:sldId id="286" r:id="rId17"/>
+    <p:sldId id="261" r:id="rId18"/>
+    <p:sldId id="274" r:id="rId19"/>
+    <p:sldId id="275" r:id="rId20"/>
+    <p:sldId id="276" r:id="rId21"/>
+    <p:sldId id="277" r:id="rId22"/>
+    <p:sldId id="278" r:id="rId23"/>
+    <p:sldId id="279" r:id="rId24"/>
+    <p:sldId id="280" r:id="rId25"/>
+    <p:sldId id="264" r:id="rId26"/>
   </p:sldIdLst>
   <p:sldSz cx="12192000" cy="6858000"/>
   <p:notesSz cx="6858000" cy="9144000"/>
@@ -114,7 +130,18 @@
   </p:defaultTextStyle>
   <p:extLst>
     <p:ext uri="{EFAFB233-063F-42B5-8137-9DF3F51BA10A}">
-      <p15:sldGuideLst xmlns:p15="http://schemas.microsoft.com/office/powerpoint/2012/main"/>
+      <p15:sldGuideLst xmlns:p15="http://schemas.microsoft.com/office/powerpoint/2012/main">
+        <p15:guide id="1" orient="horz" pos="2160">
+          <p15:clr>
+            <a:srgbClr val="A4A3A4"/>
+          </p15:clr>
+        </p15:guide>
+        <p15:guide id="2" pos="3840">
+          <p15:clr>
+            <a:srgbClr val="A4A3A4"/>
+          </p15:clr>
+        </p15:guide>
+      </p15:sldGuideLst>
     </p:ext>
   </p:extLst>
 </p:presentation>
@@ -253,7 +280,8 @@
           <a:p>
             <a:fld id="{C791A2B9-412A-4824-920F-8CF70E1AACCF}" type="datetimeFigureOut">
               <a:rPr lang="de-DE" smtClean="0"/>
-              <a:t>27.06.2017</a:t>
+              <a:pPr/>
+              <a:t>28.06.2017</a:t>
             </a:fld>
             <a:endParaRPr lang="de-DE"/>
           </a:p>
@@ -295,6 +323,7 @@
           <a:p>
             <a:fld id="{0A3C3FF0-3A20-4DD4-BD5A-9DD4AC9CB3DF}" type="slidenum">
               <a:rPr lang="de-DE" smtClean="0"/>
+              <a:pPr/>
               <a:t>‹Nr.›</a:t>
             </a:fld>
             <a:endParaRPr lang="de-DE"/>
@@ -421,7 +450,8 @@
           <a:p>
             <a:fld id="{C791A2B9-412A-4824-920F-8CF70E1AACCF}" type="datetimeFigureOut">
               <a:rPr lang="de-DE" smtClean="0"/>
-              <a:t>27.06.2017</a:t>
+              <a:pPr/>
+              <a:t>28.06.2017</a:t>
             </a:fld>
             <a:endParaRPr lang="de-DE"/>
           </a:p>
@@ -463,6 +493,7 @@
           <a:p>
             <a:fld id="{0A3C3FF0-3A20-4DD4-BD5A-9DD4AC9CB3DF}" type="slidenum">
               <a:rPr lang="de-DE" smtClean="0"/>
+              <a:pPr/>
               <a:t>‹Nr.›</a:t>
             </a:fld>
             <a:endParaRPr lang="de-DE"/>
@@ -599,7 +630,8 @@
           <a:p>
             <a:fld id="{C791A2B9-412A-4824-920F-8CF70E1AACCF}" type="datetimeFigureOut">
               <a:rPr lang="de-DE" smtClean="0"/>
-              <a:t>27.06.2017</a:t>
+              <a:pPr/>
+              <a:t>28.06.2017</a:t>
             </a:fld>
             <a:endParaRPr lang="de-DE"/>
           </a:p>
@@ -641,6 +673,7 @@
           <a:p>
             <a:fld id="{0A3C3FF0-3A20-4DD4-BD5A-9DD4AC9CB3DF}" type="slidenum">
               <a:rPr lang="de-DE" smtClean="0"/>
+              <a:pPr/>
               <a:t>‹Nr.›</a:t>
             </a:fld>
             <a:endParaRPr lang="de-DE"/>
@@ -767,7 +800,8 @@
           <a:p>
             <a:fld id="{C791A2B9-412A-4824-920F-8CF70E1AACCF}" type="datetimeFigureOut">
               <a:rPr lang="de-DE" smtClean="0"/>
-              <a:t>27.06.2017</a:t>
+              <a:pPr/>
+              <a:t>28.06.2017</a:t>
             </a:fld>
             <a:endParaRPr lang="de-DE"/>
           </a:p>
@@ -809,6 +843,7 @@
           <a:p>
             <a:fld id="{0A3C3FF0-3A20-4DD4-BD5A-9DD4AC9CB3DF}" type="slidenum">
               <a:rPr lang="de-DE" smtClean="0"/>
+              <a:pPr/>
               <a:t>‹Nr.›</a:t>
             </a:fld>
             <a:endParaRPr lang="de-DE"/>
@@ -1012,7 +1047,8 @@
           <a:p>
             <a:fld id="{C791A2B9-412A-4824-920F-8CF70E1AACCF}" type="datetimeFigureOut">
               <a:rPr lang="de-DE" smtClean="0"/>
-              <a:t>27.06.2017</a:t>
+              <a:pPr/>
+              <a:t>28.06.2017</a:t>
             </a:fld>
             <a:endParaRPr lang="de-DE"/>
           </a:p>
@@ -1054,6 +1090,7 @@
           <a:p>
             <a:fld id="{0A3C3FF0-3A20-4DD4-BD5A-9DD4AC9CB3DF}" type="slidenum">
               <a:rPr lang="de-DE" smtClean="0"/>
+              <a:pPr/>
               <a:t>‹Nr.›</a:t>
             </a:fld>
             <a:endParaRPr lang="de-DE"/>
@@ -1241,7 +1278,8 @@
           <a:p>
             <a:fld id="{C791A2B9-412A-4824-920F-8CF70E1AACCF}" type="datetimeFigureOut">
               <a:rPr lang="de-DE" smtClean="0"/>
-              <a:t>27.06.2017</a:t>
+              <a:pPr/>
+              <a:t>28.06.2017</a:t>
             </a:fld>
             <a:endParaRPr lang="de-DE"/>
           </a:p>
@@ -1283,6 +1321,7 @@
           <a:p>
             <a:fld id="{0A3C3FF0-3A20-4DD4-BD5A-9DD4AC9CB3DF}" type="slidenum">
               <a:rPr lang="de-DE" smtClean="0"/>
+              <a:pPr/>
               <a:t>‹Nr.›</a:t>
             </a:fld>
             <a:endParaRPr lang="de-DE"/>
@@ -1605,7 +1644,8 @@
           <a:p>
             <a:fld id="{C791A2B9-412A-4824-920F-8CF70E1AACCF}" type="datetimeFigureOut">
               <a:rPr lang="de-DE" smtClean="0"/>
-              <a:t>27.06.2017</a:t>
+              <a:pPr/>
+              <a:t>28.06.2017</a:t>
             </a:fld>
             <a:endParaRPr lang="de-DE"/>
           </a:p>
@@ -1647,6 +1687,7 @@
           <a:p>
             <a:fld id="{0A3C3FF0-3A20-4DD4-BD5A-9DD4AC9CB3DF}" type="slidenum">
               <a:rPr lang="de-DE" smtClean="0"/>
+              <a:pPr/>
               <a:t>‹Nr.›</a:t>
             </a:fld>
             <a:endParaRPr lang="de-DE"/>
@@ -1722,7 +1763,8 @@
           <a:p>
             <a:fld id="{C791A2B9-412A-4824-920F-8CF70E1AACCF}" type="datetimeFigureOut">
               <a:rPr lang="de-DE" smtClean="0"/>
-              <a:t>27.06.2017</a:t>
+              <a:pPr/>
+              <a:t>28.06.2017</a:t>
             </a:fld>
             <a:endParaRPr lang="de-DE"/>
           </a:p>
@@ -1764,6 +1806,7 @@
           <a:p>
             <a:fld id="{0A3C3FF0-3A20-4DD4-BD5A-9DD4AC9CB3DF}" type="slidenum">
               <a:rPr lang="de-DE" smtClean="0"/>
+              <a:pPr/>
               <a:t>‹Nr.›</a:t>
             </a:fld>
             <a:endParaRPr lang="de-DE"/>
@@ -1817,7 +1860,8 @@
           <a:p>
             <a:fld id="{C791A2B9-412A-4824-920F-8CF70E1AACCF}" type="datetimeFigureOut">
               <a:rPr lang="de-DE" smtClean="0"/>
-              <a:t>27.06.2017</a:t>
+              <a:pPr/>
+              <a:t>28.06.2017</a:t>
             </a:fld>
             <a:endParaRPr lang="de-DE"/>
           </a:p>
@@ -1859,6 +1903,7 @@
           <a:p>
             <a:fld id="{0A3C3FF0-3A20-4DD4-BD5A-9DD4AC9CB3DF}" type="slidenum">
               <a:rPr lang="de-DE" smtClean="0"/>
+              <a:pPr/>
               <a:t>‹Nr.›</a:t>
             </a:fld>
             <a:endParaRPr lang="de-DE"/>
@@ -2092,7 +2137,8 @@
           <a:p>
             <a:fld id="{C791A2B9-412A-4824-920F-8CF70E1AACCF}" type="datetimeFigureOut">
               <a:rPr lang="de-DE" smtClean="0"/>
-              <a:t>27.06.2017</a:t>
+              <a:pPr/>
+              <a:t>28.06.2017</a:t>
             </a:fld>
             <a:endParaRPr lang="de-DE"/>
           </a:p>
@@ -2134,6 +2180,7 @@
           <a:p>
             <a:fld id="{0A3C3FF0-3A20-4DD4-BD5A-9DD4AC9CB3DF}" type="slidenum">
               <a:rPr lang="de-DE" smtClean="0"/>
+              <a:pPr/>
               <a:t>‹Nr.›</a:t>
             </a:fld>
             <a:endParaRPr lang="de-DE"/>
@@ -2344,7 +2391,8 @@
           <a:p>
             <a:fld id="{C791A2B9-412A-4824-920F-8CF70E1AACCF}" type="datetimeFigureOut">
               <a:rPr lang="de-DE" smtClean="0"/>
-              <a:t>27.06.2017</a:t>
+              <a:pPr/>
+              <a:t>28.06.2017</a:t>
             </a:fld>
             <a:endParaRPr lang="de-DE"/>
           </a:p>
@@ -2386,6 +2434,7 @@
           <a:p>
             <a:fld id="{0A3C3FF0-3A20-4DD4-BD5A-9DD4AC9CB3DF}" type="slidenum">
               <a:rPr lang="de-DE" smtClean="0"/>
+              <a:pPr/>
               <a:t>‹Nr.›</a:t>
             </a:fld>
             <a:endParaRPr lang="de-DE"/>
@@ -2555,7 +2604,8 @@
           <a:p>
             <a:fld id="{C791A2B9-412A-4824-920F-8CF70E1AACCF}" type="datetimeFigureOut">
               <a:rPr lang="de-DE" smtClean="0"/>
-              <a:t>27.06.2017</a:t>
+              <a:pPr/>
+              <a:t>28.06.2017</a:t>
             </a:fld>
             <a:endParaRPr lang="de-DE"/>
           </a:p>
@@ -2633,6 +2683,7 @@
           <a:p>
             <a:fld id="{0A3C3FF0-3A20-4DD4-BD5A-9DD4AC9CB3DF}" type="slidenum">
               <a:rPr lang="de-DE" smtClean="0"/>
+              <a:pPr/>
               <a:t>‹Nr.›</a:t>
             </a:fld>
             <a:endParaRPr lang="de-DE"/>
@@ -3220,6 +3271,1918 @@
   <p:clrMapOvr>
     <a:masterClrMapping/>
   </p:clrMapOvr>
+  <p:timing>
+    <p:tnLst>
+      <p:par>
+        <p:cTn id="1" dur="indefinite" restart="never" nodeType="tmRoot"/>
+      </p:par>
+    </p:tnLst>
+  </p:timing>
+</p:sld>
+</file>
+
+<file path=ppt/slides/slide10.xml><?xml version="1.0" encoding="utf-8"?>
+<p:sld xmlns:a="http://schemas.openxmlformats.org/drawingml/2006/main" xmlns:r="http://schemas.openxmlformats.org/officeDocument/2006/relationships" xmlns:p="http://schemas.openxmlformats.org/presentationml/2006/main">
+  <p:cSld>
+    <p:spTree>
+      <p:nvGrpSpPr>
+        <p:cNvPr id="1" name=""/>
+        <p:cNvGrpSpPr/>
+        <p:nvPr/>
+      </p:nvGrpSpPr>
+      <p:grpSpPr>
+        <a:xfrm>
+          <a:off x="0" y="0"/>
+          <a:ext cx="0" cy="0"/>
+          <a:chOff x="0" y="0"/>
+          <a:chExt cx="0" cy="0"/>
+        </a:xfrm>
+      </p:grpSpPr>
+      <p:sp>
+        <p:nvSpPr>
+          <p:cNvPr id="2" name="Titel 1"/>
+          <p:cNvSpPr>
+            <a:spLocks noGrp="1"/>
+          </p:cNvSpPr>
+          <p:nvPr>
+            <p:ph type="title"/>
+          </p:nvPr>
+        </p:nvSpPr>
+        <p:spPr>
+          <a:xfrm>
+            <a:off x="866607" y="201371"/>
+            <a:ext cx="5833242" cy="690024"/>
+          </a:xfrm>
+        </p:spPr>
+        <p:txBody>
+          <a:bodyPr>
+            <a:normAutofit fontScale="90000"/>
+          </a:bodyPr>
+          <a:lstStyle/>
+          <a:p>
+            <a:r>
+              <a:rPr lang="de-DE" dirty="0" smtClean="0"/>
+              <a:t>Entwicklerdokumentation</a:t>
+            </a:r>
+            <a:endParaRPr lang="de-DE" dirty="0"/>
+          </a:p>
+        </p:txBody>
+      </p:sp>
+      <p:pic>
+        <p:nvPicPr>
+          <p:cNvPr id="4" name="Grafik 3"/>
+          <p:cNvPicPr>
+            <a:picLocks noChangeAspect="1"/>
+          </p:cNvPicPr>
+          <p:nvPr/>
+        </p:nvPicPr>
+        <p:blipFill>
+          <a:blip r:embed="rId2" cstate="print">
+            <a:extLst>
+              <a:ext uri="{28A0092B-C50C-407E-A947-70E740481C1C}">
+                <a14:useLocalDpi xmlns:a14="http://schemas.microsoft.com/office/drawing/2010/main" val="0"/>
+              </a:ext>
+            </a:extLst>
+          </a:blip>
+          <a:stretch>
+            <a:fillRect/>
+          </a:stretch>
+        </p:blipFill>
+        <p:spPr>
+          <a:xfrm>
+            <a:off x="17595" y="3325"/>
+            <a:ext cx="849012" cy="851140"/>
+          </a:xfrm>
+          <a:prstGeom prst="rect">
+            <a:avLst/>
+          </a:prstGeom>
+          <a:effectLst/>
+        </p:spPr>
+      </p:pic>
+      <p:cxnSp>
+        <p:nvCxnSpPr>
+          <p:cNvPr id="5" name="Gerader Verbinder 4"/>
+          <p:cNvCxnSpPr/>
+          <p:nvPr/>
+        </p:nvCxnSpPr>
+        <p:spPr>
+          <a:xfrm>
+            <a:off x="0" y="879893"/>
+            <a:ext cx="10668000" cy="0"/>
+          </a:xfrm>
+          <a:prstGeom prst="line">
+            <a:avLst/>
+          </a:prstGeom>
+        </p:spPr>
+        <p:style>
+          <a:lnRef idx="3">
+            <a:schemeClr val="accent2"/>
+          </a:lnRef>
+          <a:fillRef idx="0">
+            <a:schemeClr val="accent2"/>
+          </a:fillRef>
+          <a:effectRef idx="2">
+            <a:schemeClr val="accent2"/>
+          </a:effectRef>
+          <a:fontRef idx="minor">
+            <a:schemeClr val="tx1"/>
+          </a:fontRef>
+        </p:style>
+      </p:cxnSp>
+      <p:cxnSp>
+        <p:nvCxnSpPr>
+          <p:cNvPr id="6" name="Gerader Verbinder 5"/>
+          <p:cNvCxnSpPr/>
+          <p:nvPr/>
+        </p:nvCxnSpPr>
+        <p:spPr>
+          <a:xfrm>
+            <a:off x="1524000" y="6311660"/>
+            <a:ext cx="10668000" cy="0"/>
+          </a:xfrm>
+          <a:prstGeom prst="line">
+            <a:avLst/>
+          </a:prstGeom>
+        </p:spPr>
+        <p:style>
+          <a:lnRef idx="3">
+            <a:schemeClr val="accent2"/>
+          </a:lnRef>
+          <a:fillRef idx="0">
+            <a:schemeClr val="accent2"/>
+          </a:fillRef>
+          <a:effectRef idx="2">
+            <a:schemeClr val="accent2"/>
+          </a:effectRef>
+          <a:fontRef idx="minor">
+            <a:schemeClr val="tx1"/>
+          </a:fontRef>
+        </p:style>
+      </p:cxnSp>
+      <p:sp>
+        <p:nvSpPr>
+          <p:cNvPr id="7" name="Inhaltsplatzhalter 2"/>
+          <p:cNvSpPr txBox="1">
+            <a:spLocks/>
+          </p:cNvSpPr>
+          <p:nvPr/>
+        </p:nvSpPr>
+        <p:spPr>
+          <a:xfrm>
+            <a:off x="1208314" y="1244839"/>
+            <a:ext cx="10515600" cy="650156"/>
+          </a:xfrm>
+          <a:prstGeom prst="rect">
+            <a:avLst/>
+          </a:prstGeom>
+        </p:spPr>
+        <p:txBody>
+          <a:bodyPr vert="horz" lIns="91440" tIns="45720" rIns="91440" bIns="45720" rtlCol="0">
+            <a:normAutofit/>
+          </a:bodyPr>
+          <a:lstStyle>
+            <a:lvl1pPr marL="228600" indent="-228600" algn="l" defTabSz="914400" rtl="0" eaLnBrk="1" latinLnBrk="0" hangingPunct="1">
+              <a:lnSpc>
+                <a:spcPct val="90000"/>
+              </a:lnSpc>
+              <a:spcBef>
+                <a:spcPts val="1000"/>
+              </a:spcBef>
+              <a:buFont typeface="Arial" panose="020B0604020202020204" pitchFamily="34" charset="0"/>
+              <a:buChar char="•"/>
+              <a:defRPr sz="2800" kern="1200">
+                <a:solidFill>
+                  <a:schemeClr val="tx1"/>
+                </a:solidFill>
+                <a:latin typeface="+mn-lt"/>
+                <a:ea typeface="+mn-ea"/>
+                <a:cs typeface="+mn-cs"/>
+              </a:defRPr>
+            </a:lvl1pPr>
+            <a:lvl2pPr marL="685800" indent="-228600" algn="l" defTabSz="914400" rtl="0" eaLnBrk="1" latinLnBrk="0" hangingPunct="1">
+              <a:lnSpc>
+                <a:spcPct val="90000"/>
+              </a:lnSpc>
+              <a:spcBef>
+                <a:spcPts val="500"/>
+              </a:spcBef>
+              <a:buFont typeface="Arial" panose="020B0604020202020204" pitchFamily="34" charset="0"/>
+              <a:buChar char="•"/>
+              <a:defRPr sz="2400" kern="1200">
+                <a:solidFill>
+                  <a:schemeClr val="tx1"/>
+                </a:solidFill>
+                <a:latin typeface="+mn-lt"/>
+                <a:ea typeface="+mn-ea"/>
+                <a:cs typeface="+mn-cs"/>
+              </a:defRPr>
+            </a:lvl2pPr>
+            <a:lvl3pPr marL="1143000" indent="-228600" algn="l" defTabSz="914400" rtl="0" eaLnBrk="1" latinLnBrk="0" hangingPunct="1">
+              <a:lnSpc>
+                <a:spcPct val="90000"/>
+              </a:lnSpc>
+              <a:spcBef>
+                <a:spcPts val="500"/>
+              </a:spcBef>
+              <a:buFont typeface="Arial" panose="020B0604020202020204" pitchFamily="34" charset="0"/>
+              <a:buChar char="•"/>
+              <a:defRPr sz="2000" kern="1200">
+                <a:solidFill>
+                  <a:schemeClr val="tx1"/>
+                </a:solidFill>
+                <a:latin typeface="+mn-lt"/>
+                <a:ea typeface="+mn-ea"/>
+                <a:cs typeface="+mn-cs"/>
+              </a:defRPr>
+            </a:lvl3pPr>
+            <a:lvl4pPr marL="1600200" indent="-228600" algn="l" defTabSz="914400" rtl="0" eaLnBrk="1" latinLnBrk="0" hangingPunct="1">
+              <a:lnSpc>
+                <a:spcPct val="90000"/>
+              </a:lnSpc>
+              <a:spcBef>
+                <a:spcPts val="500"/>
+              </a:spcBef>
+              <a:buFont typeface="Arial" panose="020B0604020202020204" pitchFamily="34" charset="0"/>
+              <a:buChar char="•"/>
+              <a:defRPr sz="1800" kern="1200">
+                <a:solidFill>
+                  <a:schemeClr val="tx1"/>
+                </a:solidFill>
+                <a:latin typeface="+mn-lt"/>
+                <a:ea typeface="+mn-ea"/>
+                <a:cs typeface="+mn-cs"/>
+              </a:defRPr>
+            </a:lvl4pPr>
+            <a:lvl5pPr marL="2057400" indent="-228600" algn="l" defTabSz="914400" rtl="0" eaLnBrk="1" latinLnBrk="0" hangingPunct="1">
+              <a:lnSpc>
+                <a:spcPct val="90000"/>
+              </a:lnSpc>
+              <a:spcBef>
+                <a:spcPts val="500"/>
+              </a:spcBef>
+              <a:buFont typeface="Arial" panose="020B0604020202020204" pitchFamily="34" charset="0"/>
+              <a:buChar char="•"/>
+              <a:defRPr sz="1800" kern="1200">
+                <a:solidFill>
+                  <a:schemeClr val="tx1"/>
+                </a:solidFill>
+                <a:latin typeface="+mn-lt"/>
+                <a:ea typeface="+mn-ea"/>
+                <a:cs typeface="+mn-cs"/>
+              </a:defRPr>
+            </a:lvl5pPr>
+            <a:lvl6pPr marL="2514600" indent="-228600" algn="l" defTabSz="914400" rtl="0" eaLnBrk="1" latinLnBrk="0" hangingPunct="1">
+              <a:lnSpc>
+                <a:spcPct val="90000"/>
+              </a:lnSpc>
+              <a:spcBef>
+                <a:spcPts val="500"/>
+              </a:spcBef>
+              <a:buFont typeface="Arial" panose="020B0604020202020204" pitchFamily="34" charset="0"/>
+              <a:buChar char="•"/>
+              <a:defRPr sz="1800" kern="1200">
+                <a:solidFill>
+                  <a:schemeClr val="tx1"/>
+                </a:solidFill>
+                <a:latin typeface="+mn-lt"/>
+                <a:ea typeface="+mn-ea"/>
+                <a:cs typeface="+mn-cs"/>
+              </a:defRPr>
+            </a:lvl6pPr>
+            <a:lvl7pPr marL="2971800" indent="-228600" algn="l" defTabSz="914400" rtl="0" eaLnBrk="1" latinLnBrk="0" hangingPunct="1">
+              <a:lnSpc>
+                <a:spcPct val="90000"/>
+              </a:lnSpc>
+              <a:spcBef>
+                <a:spcPts val="500"/>
+              </a:spcBef>
+              <a:buFont typeface="Arial" panose="020B0604020202020204" pitchFamily="34" charset="0"/>
+              <a:buChar char="•"/>
+              <a:defRPr sz="1800" kern="1200">
+                <a:solidFill>
+                  <a:schemeClr val="tx1"/>
+                </a:solidFill>
+                <a:latin typeface="+mn-lt"/>
+                <a:ea typeface="+mn-ea"/>
+                <a:cs typeface="+mn-cs"/>
+              </a:defRPr>
+            </a:lvl7pPr>
+            <a:lvl8pPr marL="3429000" indent="-228600" algn="l" defTabSz="914400" rtl="0" eaLnBrk="1" latinLnBrk="0" hangingPunct="1">
+              <a:lnSpc>
+                <a:spcPct val="90000"/>
+              </a:lnSpc>
+              <a:spcBef>
+                <a:spcPts val="500"/>
+              </a:spcBef>
+              <a:buFont typeface="Arial" panose="020B0604020202020204" pitchFamily="34" charset="0"/>
+              <a:buChar char="•"/>
+              <a:defRPr sz="1800" kern="1200">
+                <a:solidFill>
+                  <a:schemeClr val="tx1"/>
+                </a:solidFill>
+                <a:latin typeface="+mn-lt"/>
+                <a:ea typeface="+mn-ea"/>
+                <a:cs typeface="+mn-cs"/>
+              </a:defRPr>
+            </a:lvl8pPr>
+            <a:lvl9pPr marL="3886200" indent="-228600" algn="l" defTabSz="914400" rtl="0" eaLnBrk="1" latinLnBrk="0" hangingPunct="1">
+              <a:lnSpc>
+                <a:spcPct val="90000"/>
+              </a:lnSpc>
+              <a:spcBef>
+                <a:spcPts val="500"/>
+              </a:spcBef>
+              <a:buFont typeface="Arial" panose="020B0604020202020204" pitchFamily="34" charset="0"/>
+              <a:buChar char="•"/>
+              <a:defRPr sz="1800" kern="1200">
+                <a:solidFill>
+                  <a:schemeClr val="tx1"/>
+                </a:solidFill>
+                <a:latin typeface="+mn-lt"/>
+                <a:ea typeface="+mn-ea"/>
+                <a:cs typeface="+mn-cs"/>
+              </a:defRPr>
+            </a:lvl9pPr>
+          </a:lstStyle>
+          <a:p>
+            <a:r>
+              <a:rPr lang="de-DE" dirty="0" err="1"/>
+              <a:t>Doxygen</a:t>
+            </a:r>
+            <a:r>
+              <a:rPr lang="de-DE" dirty="0"/>
+              <a:t> – Kommentar Block</a:t>
+            </a:r>
+          </a:p>
+          <a:p>
+            <a:pPr marL="457200" lvl="1" indent="0">
+              <a:buNone/>
+            </a:pPr>
+            <a:endParaRPr lang="de-DE" dirty="0"/>
+          </a:p>
+        </p:txBody>
+      </p:sp>
+      <p:pic>
+        <p:nvPicPr>
+          <p:cNvPr id="8" name="Picture 4" descr="C:\Users\Serhiy\Desktop\SE\doxyKommentar.png"/>
+          <p:cNvPicPr>
+            <a:picLocks noChangeAspect="1" noChangeArrowheads="1"/>
+          </p:cNvPicPr>
+          <p:nvPr/>
+        </p:nvPicPr>
+        <p:blipFill>
+          <a:blip r:embed="rId3" cstate="print"/>
+          <a:srcRect/>
+          <a:stretch>
+            <a:fillRect/>
+          </a:stretch>
+        </p:blipFill>
+        <p:spPr bwMode="auto">
+          <a:xfrm>
+            <a:off x="1524000" y="1983812"/>
+            <a:ext cx="9884229" cy="3981450"/>
+          </a:xfrm>
+          <a:prstGeom prst="rect">
+            <a:avLst/>
+          </a:prstGeom>
+          <a:noFill/>
+        </p:spPr>
+      </p:pic>
+    </p:spTree>
+    <p:extLst>
+      <p:ext uri="{BB962C8B-B14F-4D97-AF65-F5344CB8AC3E}">
+        <p14:creationId xmlns:p14="http://schemas.microsoft.com/office/powerpoint/2010/main" val="1836287674"/>
+      </p:ext>
+    </p:extLst>
+  </p:cSld>
+  <p:clrMapOvr>
+    <a:masterClrMapping/>
+  </p:clrMapOvr>
+  <p:timing>
+    <p:tnLst>
+      <p:par>
+        <p:cTn id="1" dur="indefinite" restart="never" nodeType="tmRoot"/>
+      </p:par>
+    </p:tnLst>
+  </p:timing>
+</p:sld>
+</file>
+
+<file path=ppt/slides/slide11.xml><?xml version="1.0" encoding="utf-8"?>
+<p:sld xmlns:a="http://schemas.openxmlformats.org/drawingml/2006/main" xmlns:r="http://schemas.openxmlformats.org/officeDocument/2006/relationships" xmlns:p="http://schemas.openxmlformats.org/presentationml/2006/main">
+  <p:cSld>
+    <p:spTree>
+      <p:nvGrpSpPr>
+        <p:cNvPr id="1" name=""/>
+        <p:cNvGrpSpPr/>
+        <p:nvPr/>
+      </p:nvGrpSpPr>
+      <p:grpSpPr>
+        <a:xfrm>
+          <a:off x="0" y="0"/>
+          <a:ext cx="0" cy="0"/>
+          <a:chOff x="0" y="0"/>
+          <a:chExt cx="0" cy="0"/>
+        </a:xfrm>
+      </p:grpSpPr>
+      <p:sp>
+        <p:nvSpPr>
+          <p:cNvPr id="3" name="Содержимое 2"/>
+          <p:cNvSpPr>
+            <a:spLocks noGrp="1"/>
+          </p:cNvSpPr>
+          <p:nvPr>
+            <p:ph idx="1"/>
+          </p:nvPr>
+        </p:nvSpPr>
+        <p:spPr/>
+        <p:txBody>
+          <a:bodyPr/>
+          <a:lstStyle/>
+          <a:p>
+            <a:r>
+              <a:rPr lang="de-DE" dirty="0" smtClean="0"/>
+              <a:t>Vorgehensweise</a:t>
+            </a:r>
+            <a:endParaRPr lang="de-DE" dirty="0"/>
+          </a:p>
+        </p:txBody>
+      </p:sp>
+      <p:sp>
+        <p:nvSpPr>
+          <p:cNvPr id="4" name="Заголовок 1"/>
+          <p:cNvSpPr>
+            <a:spLocks noGrp="1"/>
+          </p:cNvSpPr>
+          <p:nvPr>
+            <p:ph type="title"/>
+          </p:nvPr>
+        </p:nvSpPr>
+        <p:spPr>
+          <a:solidFill>
+            <a:schemeClr val="tx2">
+              <a:lumMod val="20000"/>
+              <a:lumOff val="80000"/>
+            </a:schemeClr>
+          </a:solidFill>
+        </p:spPr>
+        <p:txBody>
+          <a:bodyPr/>
+          <a:lstStyle/>
+          <a:p>
+            <a:r>
+              <a:rPr lang="de-DE" dirty="0" smtClean="0">
+                <a:solidFill>
+                  <a:srgbClr val="183BD2"/>
+                </a:solidFill>
+              </a:rPr>
+              <a:t>Entwicklerdokumentation(2)</a:t>
+            </a:r>
+            <a:endParaRPr lang="de-DE" dirty="0"/>
+          </a:p>
+        </p:txBody>
+      </p:sp>
+      <p:pic>
+        <p:nvPicPr>
+          <p:cNvPr id="2050" name="Picture 2" descr="C:\Users\Serhiy\Desktop\SE\doxyFenster.png"/>
+          <p:cNvPicPr>
+            <a:picLocks noChangeAspect="1" noChangeArrowheads="1"/>
+          </p:cNvPicPr>
+          <p:nvPr/>
+        </p:nvPicPr>
+        <p:blipFill>
+          <a:blip r:embed="rId2" cstate="print"/>
+          <a:srcRect/>
+          <a:stretch>
+            <a:fillRect/>
+          </a:stretch>
+        </p:blipFill>
+        <p:spPr bwMode="auto">
+          <a:xfrm>
+            <a:off x="888274" y="2204864"/>
+            <a:ext cx="10489475" cy="4581128"/>
+          </a:xfrm>
+          <a:prstGeom prst="rect">
+            <a:avLst/>
+          </a:prstGeom>
+          <a:noFill/>
+        </p:spPr>
+      </p:pic>
+    </p:spTree>
+  </p:cSld>
+  <p:clrMapOvr>
+    <a:masterClrMapping/>
+  </p:clrMapOvr>
+  <p:timing>
+    <p:tnLst>
+      <p:par>
+        <p:cTn id="1" dur="indefinite" restart="never" nodeType="tmRoot"/>
+      </p:par>
+    </p:tnLst>
+  </p:timing>
+</p:sld>
+</file>
+
+<file path=ppt/slides/slide12.xml><?xml version="1.0" encoding="utf-8"?>
+<p:sld xmlns:a="http://schemas.openxmlformats.org/drawingml/2006/main" xmlns:r="http://schemas.openxmlformats.org/officeDocument/2006/relationships" xmlns:p="http://schemas.openxmlformats.org/presentationml/2006/main">
+  <p:cSld>
+    <p:spTree>
+      <p:nvGrpSpPr>
+        <p:cNvPr id="1" name=""/>
+        <p:cNvGrpSpPr/>
+        <p:nvPr/>
+      </p:nvGrpSpPr>
+      <p:grpSpPr>
+        <a:xfrm>
+          <a:off x="0" y="0"/>
+          <a:ext cx="0" cy="0"/>
+          <a:chOff x="0" y="0"/>
+          <a:chExt cx="0" cy="0"/>
+        </a:xfrm>
+      </p:grpSpPr>
+      <p:sp>
+        <p:nvSpPr>
+          <p:cNvPr id="4" name="Заголовок 1"/>
+          <p:cNvSpPr>
+            <a:spLocks noGrp="1"/>
+          </p:cNvSpPr>
+          <p:nvPr>
+            <p:ph type="title"/>
+          </p:nvPr>
+        </p:nvSpPr>
+        <p:spPr>
+          <a:solidFill>
+            <a:schemeClr val="tx2">
+              <a:lumMod val="20000"/>
+              <a:lumOff val="80000"/>
+            </a:schemeClr>
+          </a:solidFill>
+        </p:spPr>
+        <p:txBody>
+          <a:bodyPr/>
+          <a:lstStyle/>
+          <a:p>
+            <a:r>
+              <a:rPr lang="de-DE" dirty="0" smtClean="0">
+                <a:solidFill>
+                  <a:srgbClr val="183BD2"/>
+                </a:solidFill>
+              </a:rPr>
+              <a:t>Entwicklerdokumentation(3)</a:t>
+            </a:r>
+            <a:endParaRPr lang="de-DE" dirty="0"/>
+          </a:p>
+        </p:txBody>
+      </p:sp>
+      <p:sp>
+        <p:nvSpPr>
+          <p:cNvPr id="6" name="Содержимое 5"/>
+          <p:cNvSpPr>
+            <a:spLocks noGrp="1"/>
+          </p:cNvSpPr>
+          <p:nvPr>
+            <p:ph idx="1"/>
+          </p:nvPr>
+        </p:nvSpPr>
+        <p:spPr/>
+        <p:txBody>
+          <a:bodyPr/>
+          <a:lstStyle/>
+          <a:p>
+            <a:r>
+              <a:rPr lang="de-DE" dirty="0" smtClean="0"/>
+              <a:t>Generierte Dokumentation</a:t>
+            </a:r>
+            <a:endParaRPr lang="de-DE" dirty="0"/>
+          </a:p>
+        </p:txBody>
+      </p:sp>
+      <p:pic>
+        <p:nvPicPr>
+          <p:cNvPr id="3074" name="Picture 2" descr="C:\Users\Serhiy\Desktop\SE\doxyFertig.png"/>
+          <p:cNvPicPr>
+            <a:picLocks noChangeAspect="1" noChangeArrowheads="1"/>
+          </p:cNvPicPr>
+          <p:nvPr/>
+        </p:nvPicPr>
+        <p:blipFill>
+          <a:blip r:embed="rId2" cstate="print"/>
+          <a:srcRect/>
+          <a:stretch>
+            <a:fillRect/>
+          </a:stretch>
+        </p:blipFill>
+        <p:spPr bwMode="auto">
+          <a:xfrm>
+            <a:off x="815413" y="2348880"/>
+            <a:ext cx="10657184" cy="3744416"/>
+          </a:xfrm>
+          <a:prstGeom prst="rect">
+            <a:avLst/>
+          </a:prstGeom>
+          <a:noFill/>
+        </p:spPr>
+      </p:pic>
+    </p:spTree>
+  </p:cSld>
+  <p:clrMapOvr>
+    <a:masterClrMapping/>
+  </p:clrMapOvr>
+  <p:timing>
+    <p:tnLst>
+      <p:par>
+        <p:cTn id="1" dur="indefinite" restart="never" nodeType="tmRoot"/>
+      </p:par>
+    </p:tnLst>
+  </p:timing>
+</p:sld>
+</file>
+
+<file path=ppt/slides/slide13.xml><?xml version="1.0" encoding="utf-8"?>
+<p:sld xmlns:a="http://schemas.openxmlformats.org/drawingml/2006/main" xmlns:r="http://schemas.openxmlformats.org/officeDocument/2006/relationships" xmlns:p="http://schemas.openxmlformats.org/presentationml/2006/main">
+  <p:cSld>
+    <p:spTree>
+      <p:nvGrpSpPr>
+        <p:cNvPr id="1" name=""/>
+        <p:cNvGrpSpPr/>
+        <p:nvPr/>
+      </p:nvGrpSpPr>
+      <p:grpSpPr>
+        <a:xfrm>
+          <a:off x="0" y="0"/>
+          <a:ext cx="0" cy="0"/>
+          <a:chOff x="0" y="0"/>
+          <a:chExt cx="0" cy="0"/>
+        </a:xfrm>
+      </p:grpSpPr>
+      <p:pic>
+        <p:nvPicPr>
+          <p:cNvPr id="5" name="Содержимое 4" descr="doxyFertig2.png"/>
+          <p:cNvPicPr>
+            <a:picLocks noGrp="1" noChangeAspect="1"/>
+          </p:cNvPicPr>
+          <p:nvPr>
+            <p:ph idx="1"/>
+          </p:nvPr>
+        </p:nvPicPr>
+        <p:blipFill>
+          <a:blip r:embed="rId2" cstate="print"/>
+          <a:stretch>
+            <a:fillRect/>
+          </a:stretch>
+        </p:blipFill>
+        <p:spPr>
+          <a:xfrm>
+            <a:off x="914400" y="2509952"/>
+            <a:ext cx="10437223" cy="2706461"/>
+          </a:xfrm>
+        </p:spPr>
+      </p:pic>
+      <p:sp>
+        <p:nvSpPr>
+          <p:cNvPr id="4" name="Заголовок 1"/>
+          <p:cNvSpPr>
+            <a:spLocks noGrp="1"/>
+          </p:cNvSpPr>
+          <p:nvPr>
+            <p:ph type="title"/>
+          </p:nvPr>
+        </p:nvSpPr>
+        <p:spPr>
+          <a:solidFill>
+            <a:schemeClr val="tx2">
+              <a:lumMod val="20000"/>
+              <a:lumOff val="80000"/>
+            </a:schemeClr>
+          </a:solidFill>
+        </p:spPr>
+        <p:txBody>
+          <a:bodyPr/>
+          <a:lstStyle/>
+          <a:p>
+            <a:r>
+              <a:rPr lang="de-DE" dirty="0" smtClean="0">
+                <a:solidFill>
+                  <a:srgbClr val="183BD2"/>
+                </a:solidFill>
+              </a:rPr>
+              <a:t>Entwicklerdokumentation(4)</a:t>
+            </a:r>
+            <a:endParaRPr lang="de-DE" dirty="0"/>
+          </a:p>
+        </p:txBody>
+      </p:sp>
+    </p:spTree>
+  </p:cSld>
+  <p:clrMapOvr>
+    <a:masterClrMapping/>
+  </p:clrMapOvr>
+  <p:timing>
+    <p:tnLst>
+      <p:par>
+        <p:cTn id="1" dur="indefinite" restart="never" nodeType="tmRoot"/>
+      </p:par>
+    </p:tnLst>
+  </p:timing>
+</p:sld>
+</file>
+
+<file path=ppt/slides/slide14.xml><?xml version="1.0" encoding="utf-8"?>
+<p:sld xmlns:a="http://schemas.openxmlformats.org/drawingml/2006/main" xmlns:r="http://schemas.openxmlformats.org/officeDocument/2006/relationships" xmlns:p="http://schemas.openxmlformats.org/presentationml/2006/main">
+  <p:cSld>
+    <p:spTree>
+      <p:nvGrpSpPr>
+        <p:cNvPr id="1" name=""/>
+        <p:cNvGrpSpPr/>
+        <p:nvPr/>
+      </p:nvGrpSpPr>
+      <p:grpSpPr>
+        <a:xfrm>
+          <a:off x="0" y="0"/>
+          <a:ext cx="0" cy="0"/>
+          <a:chOff x="0" y="0"/>
+          <a:chExt cx="0" cy="0"/>
+        </a:xfrm>
+      </p:grpSpPr>
+      <p:sp>
+        <p:nvSpPr>
+          <p:cNvPr id="2" name="Titel 1"/>
+          <p:cNvSpPr>
+            <a:spLocks noGrp="1"/>
+          </p:cNvSpPr>
+          <p:nvPr>
+            <p:ph type="title"/>
+          </p:nvPr>
+        </p:nvSpPr>
+        <p:spPr>
+          <a:xfrm>
+            <a:off x="866607" y="201371"/>
+            <a:ext cx="7564276" cy="690024"/>
+          </a:xfrm>
+        </p:spPr>
+        <p:txBody>
+          <a:bodyPr>
+            <a:normAutofit fontScale="90000"/>
+          </a:bodyPr>
+          <a:lstStyle/>
+          <a:p>
+            <a:r>
+              <a:rPr lang="de-DE" dirty="0" smtClean="0"/>
+              <a:t>Verwendete Softwaretools</a:t>
+            </a:r>
+            <a:endParaRPr lang="de-DE" dirty="0"/>
+          </a:p>
+        </p:txBody>
+      </p:sp>
+      <p:sp>
+        <p:nvSpPr>
+          <p:cNvPr id="3" name="Inhaltsplatzhalter 2"/>
+          <p:cNvSpPr>
+            <a:spLocks noGrp="1"/>
+          </p:cNvSpPr>
+          <p:nvPr>
+            <p:ph idx="1"/>
+          </p:nvPr>
+        </p:nvSpPr>
+        <p:spPr>
+          <a:xfrm>
+            <a:off x="1524000" y="1365550"/>
+            <a:ext cx="2543702" cy="4023084"/>
+          </a:xfrm>
+        </p:spPr>
+        <p:txBody>
+          <a:bodyPr>
+            <a:normAutofit lnSpcReduction="10000"/>
+          </a:bodyPr>
+          <a:lstStyle/>
+          <a:p>
+            <a:endParaRPr lang="de-DE" dirty="0"/>
+          </a:p>
+          <a:p>
+            <a:r>
+              <a:rPr lang="de-DE" dirty="0" err="1" smtClean="0"/>
+              <a:t>GitHub</a:t>
+            </a:r>
+            <a:endParaRPr lang="de-DE" dirty="0" smtClean="0"/>
+          </a:p>
+          <a:p>
+            <a:r>
+              <a:rPr lang="de-DE" dirty="0" err="1"/>
+              <a:t>Topcased</a:t>
+            </a:r>
+            <a:endParaRPr lang="de-DE" dirty="0"/>
+          </a:p>
+          <a:p>
+            <a:r>
+              <a:rPr lang="de-DE" dirty="0" err="1" smtClean="0"/>
+              <a:t>NinjaMock</a:t>
+            </a:r>
+            <a:endParaRPr lang="de-DE" dirty="0" smtClean="0"/>
+          </a:p>
+          <a:p>
+            <a:r>
+              <a:rPr lang="de-DE" dirty="0" err="1" smtClean="0"/>
+              <a:t>Eclipse</a:t>
+            </a:r>
+            <a:r>
+              <a:rPr lang="de-DE" dirty="0" smtClean="0"/>
+              <a:t> </a:t>
+            </a:r>
+          </a:p>
+          <a:p>
+            <a:r>
+              <a:rPr lang="de-DE" dirty="0" err="1" smtClean="0"/>
+              <a:t>Gradle</a:t>
+            </a:r>
+            <a:endParaRPr lang="de-DE" dirty="0" smtClean="0"/>
+          </a:p>
+          <a:p>
+            <a:r>
+              <a:rPr lang="de-DE" dirty="0" err="1" smtClean="0"/>
+              <a:t>JUnit</a:t>
+            </a:r>
+            <a:endParaRPr lang="de-DE" dirty="0" smtClean="0"/>
+          </a:p>
+          <a:p>
+            <a:r>
+              <a:rPr lang="de-DE" dirty="0" err="1" smtClean="0"/>
+              <a:t>Doxygen</a:t>
+            </a:r>
+            <a:endParaRPr lang="de-DE" dirty="0" smtClean="0"/>
+          </a:p>
+        </p:txBody>
+      </p:sp>
+      <p:pic>
+        <p:nvPicPr>
+          <p:cNvPr id="4" name="Grafik 3"/>
+          <p:cNvPicPr>
+            <a:picLocks noChangeAspect="1"/>
+          </p:cNvPicPr>
+          <p:nvPr/>
+        </p:nvPicPr>
+        <p:blipFill>
+          <a:blip r:embed="rId2" cstate="print">
+            <a:extLst>
+              <a:ext uri="{28A0092B-C50C-407E-A947-70E740481C1C}">
+                <a14:useLocalDpi xmlns:a14="http://schemas.microsoft.com/office/drawing/2010/main" val="0"/>
+              </a:ext>
+            </a:extLst>
+          </a:blip>
+          <a:stretch>
+            <a:fillRect/>
+          </a:stretch>
+        </p:blipFill>
+        <p:spPr>
+          <a:xfrm>
+            <a:off x="17595" y="3325"/>
+            <a:ext cx="849012" cy="851140"/>
+          </a:xfrm>
+          <a:prstGeom prst="rect">
+            <a:avLst/>
+          </a:prstGeom>
+          <a:effectLst/>
+        </p:spPr>
+      </p:pic>
+      <p:cxnSp>
+        <p:nvCxnSpPr>
+          <p:cNvPr id="5" name="Gerader Verbinder 4"/>
+          <p:cNvCxnSpPr/>
+          <p:nvPr/>
+        </p:nvCxnSpPr>
+        <p:spPr>
+          <a:xfrm>
+            <a:off x="0" y="879893"/>
+            <a:ext cx="10668000" cy="0"/>
+          </a:xfrm>
+          <a:prstGeom prst="line">
+            <a:avLst/>
+          </a:prstGeom>
+        </p:spPr>
+        <p:style>
+          <a:lnRef idx="3">
+            <a:schemeClr val="accent2"/>
+          </a:lnRef>
+          <a:fillRef idx="0">
+            <a:schemeClr val="accent2"/>
+          </a:fillRef>
+          <a:effectRef idx="2">
+            <a:schemeClr val="accent2"/>
+          </a:effectRef>
+          <a:fontRef idx="minor">
+            <a:schemeClr val="tx1"/>
+          </a:fontRef>
+        </p:style>
+      </p:cxnSp>
+      <p:cxnSp>
+        <p:nvCxnSpPr>
+          <p:cNvPr id="6" name="Gerader Verbinder 5"/>
+          <p:cNvCxnSpPr/>
+          <p:nvPr/>
+        </p:nvCxnSpPr>
+        <p:spPr>
+          <a:xfrm>
+            <a:off x="1524000" y="6311660"/>
+            <a:ext cx="10668000" cy="0"/>
+          </a:xfrm>
+          <a:prstGeom prst="line">
+            <a:avLst/>
+          </a:prstGeom>
+        </p:spPr>
+        <p:style>
+          <a:lnRef idx="3">
+            <a:schemeClr val="accent2"/>
+          </a:lnRef>
+          <a:fillRef idx="0">
+            <a:schemeClr val="accent2"/>
+          </a:fillRef>
+          <a:effectRef idx="2">
+            <a:schemeClr val="accent2"/>
+          </a:effectRef>
+          <a:fontRef idx="minor">
+            <a:schemeClr val="tx1"/>
+          </a:fontRef>
+        </p:style>
+      </p:cxnSp>
+    </p:spTree>
+    <p:extLst>
+      <p:ext uri="{BB962C8B-B14F-4D97-AF65-F5344CB8AC3E}">
+        <p14:creationId xmlns:p14="http://schemas.microsoft.com/office/powerpoint/2010/main" val="3592684440"/>
+      </p:ext>
+    </p:extLst>
+  </p:cSld>
+  <p:clrMapOvr>
+    <a:masterClrMapping/>
+  </p:clrMapOvr>
+  <p:timing>
+    <p:tnLst>
+      <p:par>
+        <p:cTn id="1" dur="indefinite" restart="never" nodeType="tmRoot"/>
+      </p:par>
+    </p:tnLst>
+  </p:timing>
+</p:sld>
+</file>
+
+<file path=ppt/slides/slide15.xml><?xml version="1.0" encoding="utf-8"?>
+<p:sld xmlns:a="http://schemas.openxmlformats.org/drawingml/2006/main" xmlns:r="http://schemas.openxmlformats.org/officeDocument/2006/relationships" xmlns:p="http://schemas.openxmlformats.org/presentationml/2006/main">
+  <p:cSld>
+    <p:spTree>
+      <p:nvGrpSpPr>
+        <p:cNvPr id="1" name=""/>
+        <p:cNvGrpSpPr/>
+        <p:nvPr/>
+      </p:nvGrpSpPr>
+      <p:grpSpPr>
+        <a:xfrm>
+          <a:off x="0" y="0"/>
+          <a:ext cx="0" cy="0"/>
+          <a:chOff x="0" y="0"/>
+          <a:chExt cx="0" cy="0"/>
+        </a:xfrm>
+      </p:grpSpPr>
+      <p:sp>
+        <p:nvSpPr>
+          <p:cNvPr id="2" name="Titel 1"/>
+          <p:cNvSpPr>
+            <a:spLocks noGrp="1"/>
+          </p:cNvSpPr>
+          <p:nvPr>
+            <p:ph type="title"/>
+          </p:nvPr>
+        </p:nvSpPr>
+        <p:spPr>
+          <a:xfrm>
+            <a:off x="866607" y="201371"/>
+            <a:ext cx="7564276" cy="690024"/>
+          </a:xfrm>
+        </p:spPr>
+        <p:txBody>
+          <a:bodyPr>
+            <a:normAutofit fontScale="90000"/>
+          </a:bodyPr>
+          <a:lstStyle/>
+          <a:p>
+            <a:r>
+              <a:rPr lang="de-DE" dirty="0"/>
+              <a:t>Verwendete SWT - </a:t>
+            </a:r>
+            <a:r>
+              <a:rPr lang="de-DE" dirty="0" err="1" smtClean="0"/>
+              <a:t>GitHub</a:t>
+            </a:r>
+            <a:endParaRPr lang="de-DE" dirty="0"/>
+          </a:p>
+        </p:txBody>
+      </p:sp>
+      <p:sp>
+        <p:nvSpPr>
+          <p:cNvPr id="3" name="Inhaltsplatzhalter 2"/>
+          <p:cNvSpPr>
+            <a:spLocks noGrp="1"/>
+          </p:cNvSpPr>
+          <p:nvPr>
+            <p:ph idx="1"/>
+          </p:nvPr>
+        </p:nvSpPr>
+        <p:spPr>
+          <a:xfrm>
+            <a:off x="8603411" y="1167318"/>
+            <a:ext cx="2800710" cy="2869846"/>
+          </a:xfrm>
+        </p:spPr>
+        <p:txBody>
+          <a:bodyPr>
+            <a:normAutofit/>
+          </a:bodyPr>
+          <a:lstStyle/>
+          <a:p>
+            <a:r>
+              <a:rPr lang="de-DE" i="1" dirty="0" smtClean="0"/>
+              <a:t>verbreiteter </a:t>
+            </a:r>
+          </a:p>
+          <a:p>
+            <a:r>
+              <a:rPr lang="de-DE" i="1" dirty="0"/>
+              <a:t>s</a:t>
+            </a:r>
+            <a:r>
+              <a:rPr lang="de-DE" i="1" dirty="0" smtClean="0"/>
+              <a:t>chnell</a:t>
+            </a:r>
+          </a:p>
+          <a:p>
+            <a:r>
+              <a:rPr lang="de-DE" i="1" dirty="0" smtClean="0"/>
+              <a:t>effizient </a:t>
+            </a:r>
+          </a:p>
+          <a:p>
+            <a:r>
+              <a:rPr lang="de-DE" i="1" dirty="0" smtClean="0"/>
+              <a:t>verfügt über Desktopversion</a:t>
+            </a:r>
+            <a:endParaRPr lang="de-DE" dirty="0"/>
+          </a:p>
+        </p:txBody>
+      </p:sp>
+      <p:pic>
+        <p:nvPicPr>
+          <p:cNvPr id="4" name="Grafik 3"/>
+          <p:cNvPicPr>
+            <a:picLocks noChangeAspect="1"/>
+          </p:cNvPicPr>
+          <p:nvPr/>
+        </p:nvPicPr>
+        <p:blipFill>
+          <a:blip r:embed="rId2" cstate="print">
+            <a:extLst>
+              <a:ext uri="{28A0092B-C50C-407E-A947-70E740481C1C}">
+                <a14:useLocalDpi xmlns:a14="http://schemas.microsoft.com/office/drawing/2010/main" val="0"/>
+              </a:ext>
+            </a:extLst>
+          </a:blip>
+          <a:stretch>
+            <a:fillRect/>
+          </a:stretch>
+        </p:blipFill>
+        <p:spPr>
+          <a:xfrm>
+            <a:off x="17595" y="3325"/>
+            <a:ext cx="849012" cy="851140"/>
+          </a:xfrm>
+          <a:prstGeom prst="rect">
+            <a:avLst/>
+          </a:prstGeom>
+          <a:effectLst/>
+        </p:spPr>
+      </p:pic>
+      <p:cxnSp>
+        <p:nvCxnSpPr>
+          <p:cNvPr id="5" name="Gerader Verbinder 4"/>
+          <p:cNvCxnSpPr/>
+          <p:nvPr/>
+        </p:nvCxnSpPr>
+        <p:spPr>
+          <a:xfrm>
+            <a:off x="0" y="879893"/>
+            <a:ext cx="10668000" cy="0"/>
+          </a:xfrm>
+          <a:prstGeom prst="line">
+            <a:avLst/>
+          </a:prstGeom>
+        </p:spPr>
+        <p:style>
+          <a:lnRef idx="3">
+            <a:schemeClr val="accent2"/>
+          </a:lnRef>
+          <a:fillRef idx="0">
+            <a:schemeClr val="accent2"/>
+          </a:fillRef>
+          <a:effectRef idx="2">
+            <a:schemeClr val="accent2"/>
+          </a:effectRef>
+          <a:fontRef idx="minor">
+            <a:schemeClr val="tx1"/>
+          </a:fontRef>
+        </p:style>
+      </p:cxnSp>
+      <p:cxnSp>
+        <p:nvCxnSpPr>
+          <p:cNvPr id="6" name="Gerader Verbinder 5"/>
+          <p:cNvCxnSpPr/>
+          <p:nvPr/>
+        </p:nvCxnSpPr>
+        <p:spPr>
+          <a:xfrm>
+            <a:off x="1524000" y="6311660"/>
+            <a:ext cx="10668000" cy="0"/>
+          </a:xfrm>
+          <a:prstGeom prst="line">
+            <a:avLst/>
+          </a:prstGeom>
+        </p:spPr>
+        <p:style>
+          <a:lnRef idx="3">
+            <a:schemeClr val="accent2"/>
+          </a:lnRef>
+          <a:fillRef idx="0">
+            <a:schemeClr val="accent2"/>
+          </a:fillRef>
+          <a:effectRef idx="2">
+            <a:schemeClr val="accent2"/>
+          </a:effectRef>
+          <a:fontRef idx="minor">
+            <a:schemeClr val="tx1"/>
+          </a:fontRef>
+        </p:style>
+      </p:cxnSp>
+      <p:pic>
+        <p:nvPicPr>
+          <p:cNvPr id="7" name="Grafik 6"/>
+          <p:cNvPicPr>
+            <a:picLocks noChangeAspect="1"/>
+          </p:cNvPicPr>
+          <p:nvPr/>
+        </p:nvPicPr>
+        <p:blipFill>
+          <a:blip r:embed="rId3" cstate="print">
+            <a:extLst>
+              <a:ext uri="{28A0092B-C50C-407E-A947-70E740481C1C}">
+                <a14:useLocalDpi xmlns:a14="http://schemas.microsoft.com/office/drawing/2010/main" val="0"/>
+              </a:ext>
+            </a:extLst>
+          </a:blip>
+          <a:stretch>
+            <a:fillRect/>
+          </a:stretch>
+        </p:blipFill>
+        <p:spPr>
+          <a:xfrm>
+            <a:off x="1285488" y="1167318"/>
+            <a:ext cx="7145395" cy="4690257"/>
+          </a:xfrm>
+          <a:prstGeom prst="rect">
+            <a:avLst/>
+          </a:prstGeom>
+        </p:spPr>
+      </p:pic>
+    </p:spTree>
+    <p:extLst>
+      <p:ext uri="{BB962C8B-B14F-4D97-AF65-F5344CB8AC3E}">
+        <p14:creationId xmlns:p14="http://schemas.microsoft.com/office/powerpoint/2010/main" val="1565029412"/>
+      </p:ext>
+    </p:extLst>
+  </p:cSld>
+  <p:clrMapOvr>
+    <a:masterClrMapping/>
+  </p:clrMapOvr>
+  <p:timing>
+    <p:tnLst>
+      <p:par>
+        <p:cTn id="1" dur="indefinite" restart="never" nodeType="tmRoot"/>
+      </p:par>
+    </p:tnLst>
+  </p:timing>
+</p:sld>
+</file>
+
+<file path=ppt/slides/slide16.xml><?xml version="1.0" encoding="utf-8"?>
+<p:sld xmlns:a="http://schemas.openxmlformats.org/drawingml/2006/main" xmlns:r="http://schemas.openxmlformats.org/officeDocument/2006/relationships" xmlns:p="http://schemas.openxmlformats.org/presentationml/2006/main">
+  <p:cSld>
+    <p:spTree>
+      <p:nvGrpSpPr>
+        <p:cNvPr id="1" name=""/>
+        <p:cNvGrpSpPr/>
+        <p:nvPr/>
+      </p:nvGrpSpPr>
+      <p:grpSpPr>
+        <a:xfrm>
+          <a:off x="0" y="0"/>
+          <a:ext cx="0" cy="0"/>
+          <a:chOff x="0" y="0"/>
+          <a:chExt cx="0" cy="0"/>
+        </a:xfrm>
+      </p:grpSpPr>
+      <p:sp>
+        <p:nvSpPr>
+          <p:cNvPr id="2" name="Titel 1"/>
+          <p:cNvSpPr>
+            <a:spLocks noGrp="1"/>
+          </p:cNvSpPr>
+          <p:nvPr>
+            <p:ph type="title"/>
+          </p:nvPr>
+        </p:nvSpPr>
+        <p:spPr>
+          <a:xfrm>
+            <a:off x="866607" y="201371"/>
+            <a:ext cx="7564276" cy="690024"/>
+          </a:xfrm>
+        </p:spPr>
+        <p:txBody>
+          <a:bodyPr>
+            <a:normAutofit fontScale="90000"/>
+          </a:bodyPr>
+          <a:lstStyle/>
+          <a:p>
+            <a:r>
+              <a:rPr lang="de-DE" dirty="0"/>
+              <a:t>Verwendete SWT - </a:t>
+            </a:r>
+            <a:r>
+              <a:rPr lang="de-DE" dirty="0" err="1" smtClean="0"/>
+              <a:t>NinjaMock</a:t>
+            </a:r>
+            <a:endParaRPr lang="de-DE" dirty="0"/>
+          </a:p>
+        </p:txBody>
+      </p:sp>
+      <p:sp>
+        <p:nvSpPr>
+          <p:cNvPr id="3" name="Inhaltsplatzhalter 2"/>
+          <p:cNvSpPr>
+            <a:spLocks noGrp="1"/>
+          </p:cNvSpPr>
+          <p:nvPr>
+            <p:ph idx="1"/>
+          </p:nvPr>
+        </p:nvSpPr>
+        <p:spPr>
+          <a:xfrm>
+            <a:off x="8925463" y="1296538"/>
+            <a:ext cx="3266537" cy="4707033"/>
+          </a:xfrm>
+        </p:spPr>
+        <p:txBody>
+          <a:bodyPr/>
+          <a:lstStyle/>
+          <a:p>
+            <a:r>
+              <a:rPr lang="de-DE" dirty="0" smtClean="0"/>
+              <a:t>Online verfügbar</a:t>
+            </a:r>
+          </a:p>
+          <a:p>
+            <a:r>
+              <a:rPr lang="de-DE" dirty="0" smtClean="0"/>
+              <a:t>Gleichzeitiges Arbeiten mehrerer Benutzer möglich</a:t>
+            </a:r>
+          </a:p>
+          <a:p>
+            <a:r>
+              <a:rPr lang="de-DE" dirty="0" smtClean="0"/>
+              <a:t>Intuitiv</a:t>
+            </a:r>
+          </a:p>
+          <a:p>
+            <a:r>
+              <a:rPr lang="de-DE" dirty="0" smtClean="0"/>
+              <a:t>unkompliziert</a:t>
+            </a:r>
+            <a:endParaRPr lang="de-DE" dirty="0"/>
+          </a:p>
+        </p:txBody>
+      </p:sp>
+      <p:pic>
+        <p:nvPicPr>
+          <p:cNvPr id="4" name="Grafik 3"/>
+          <p:cNvPicPr>
+            <a:picLocks noChangeAspect="1"/>
+          </p:cNvPicPr>
+          <p:nvPr/>
+        </p:nvPicPr>
+        <p:blipFill>
+          <a:blip r:embed="rId2" cstate="print">
+            <a:extLst>
+              <a:ext uri="{28A0092B-C50C-407E-A947-70E740481C1C}">
+                <a14:useLocalDpi xmlns:a14="http://schemas.microsoft.com/office/drawing/2010/main" val="0"/>
+              </a:ext>
+            </a:extLst>
+          </a:blip>
+          <a:stretch>
+            <a:fillRect/>
+          </a:stretch>
+        </p:blipFill>
+        <p:spPr>
+          <a:xfrm>
+            <a:off x="17595" y="3325"/>
+            <a:ext cx="849012" cy="851140"/>
+          </a:xfrm>
+          <a:prstGeom prst="rect">
+            <a:avLst/>
+          </a:prstGeom>
+          <a:effectLst/>
+        </p:spPr>
+      </p:pic>
+      <p:cxnSp>
+        <p:nvCxnSpPr>
+          <p:cNvPr id="5" name="Gerader Verbinder 4"/>
+          <p:cNvCxnSpPr/>
+          <p:nvPr/>
+        </p:nvCxnSpPr>
+        <p:spPr>
+          <a:xfrm>
+            <a:off x="0" y="879893"/>
+            <a:ext cx="10668000" cy="0"/>
+          </a:xfrm>
+          <a:prstGeom prst="line">
+            <a:avLst/>
+          </a:prstGeom>
+        </p:spPr>
+        <p:style>
+          <a:lnRef idx="3">
+            <a:schemeClr val="accent2"/>
+          </a:lnRef>
+          <a:fillRef idx="0">
+            <a:schemeClr val="accent2"/>
+          </a:fillRef>
+          <a:effectRef idx="2">
+            <a:schemeClr val="accent2"/>
+          </a:effectRef>
+          <a:fontRef idx="minor">
+            <a:schemeClr val="tx1"/>
+          </a:fontRef>
+        </p:style>
+      </p:cxnSp>
+      <p:cxnSp>
+        <p:nvCxnSpPr>
+          <p:cNvPr id="6" name="Gerader Verbinder 5"/>
+          <p:cNvCxnSpPr/>
+          <p:nvPr/>
+        </p:nvCxnSpPr>
+        <p:spPr>
+          <a:xfrm>
+            <a:off x="1524000" y="6311660"/>
+            <a:ext cx="10668000" cy="0"/>
+          </a:xfrm>
+          <a:prstGeom prst="line">
+            <a:avLst/>
+          </a:prstGeom>
+        </p:spPr>
+        <p:style>
+          <a:lnRef idx="3">
+            <a:schemeClr val="accent2"/>
+          </a:lnRef>
+          <a:fillRef idx="0">
+            <a:schemeClr val="accent2"/>
+          </a:fillRef>
+          <a:effectRef idx="2">
+            <a:schemeClr val="accent2"/>
+          </a:effectRef>
+          <a:fontRef idx="minor">
+            <a:schemeClr val="tx1"/>
+          </a:fontRef>
+        </p:style>
+      </p:cxnSp>
+      <p:pic>
+        <p:nvPicPr>
+          <p:cNvPr id="7" name="Grafik 6"/>
+          <p:cNvPicPr>
+            <a:picLocks noChangeAspect="1"/>
+          </p:cNvPicPr>
+          <p:nvPr/>
+        </p:nvPicPr>
+        <p:blipFill>
+          <a:blip r:embed="rId3" cstate="print">
+            <a:extLst>
+              <a:ext uri="{28A0092B-C50C-407E-A947-70E740481C1C}">
+                <a14:useLocalDpi xmlns:a14="http://schemas.microsoft.com/office/drawing/2010/main" val="0"/>
+              </a:ext>
+            </a:extLst>
+          </a:blip>
+          <a:stretch>
+            <a:fillRect/>
+          </a:stretch>
+        </p:blipFill>
+        <p:spPr>
+          <a:xfrm>
+            <a:off x="651839" y="1250886"/>
+            <a:ext cx="7993811" cy="4689781"/>
+          </a:xfrm>
+          <a:prstGeom prst="rect">
+            <a:avLst/>
+          </a:prstGeom>
+        </p:spPr>
+      </p:pic>
+    </p:spTree>
+    <p:extLst>
+      <p:ext uri="{BB962C8B-B14F-4D97-AF65-F5344CB8AC3E}">
+        <p14:creationId xmlns:p14="http://schemas.microsoft.com/office/powerpoint/2010/main" val="540480175"/>
+      </p:ext>
+    </p:extLst>
+  </p:cSld>
+  <p:clrMapOvr>
+    <a:masterClrMapping/>
+  </p:clrMapOvr>
+  <p:timing>
+    <p:tnLst>
+      <p:par>
+        <p:cTn id="1" dur="indefinite" restart="never" nodeType="tmRoot"/>
+      </p:par>
+    </p:tnLst>
+  </p:timing>
+</p:sld>
+</file>
+
+<file path=ppt/slides/slide17.xml><?xml version="1.0" encoding="utf-8"?>
+<p:sld xmlns:a="http://schemas.openxmlformats.org/drawingml/2006/main" xmlns:r="http://schemas.openxmlformats.org/officeDocument/2006/relationships" xmlns:p="http://schemas.openxmlformats.org/presentationml/2006/main">
+  <p:cSld>
+    <p:spTree>
+      <p:nvGrpSpPr>
+        <p:cNvPr id="1" name=""/>
+        <p:cNvGrpSpPr/>
+        <p:nvPr/>
+      </p:nvGrpSpPr>
+      <p:grpSpPr>
+        <a:xfrm>
+          <a:off x="0" y="0"/>
+          <a:ext cx="0" cy="0"/>
+          <a:chOff x="0" y="0"/>
+          <a:chExt cx="0" cy="0"/>
+        </a:xfrm>
+      </p:grpSpPr>
+      <p:sp>
+        <p:nvSpPr>
+          <p:cNvPr id="2" name="Titel 1"/>
+          <p:cNvSpPr>
+            <a:spLocks noGrp="1"/>
+          </p:cNvSpPr>
+          <p:nvPr>
+            <p:ph type="title"/>
+          </p:nvPr>
+        </p:nvSpPr>
+        <p:spPr>
+          <a:xfrm>
+            <a:off x="866607" y="201371"/>
+            <a:ext cx="6126540" cy="690024"/>
+          </a:xfrm>
+        </p:spPr>
+        <p:txBody>
+          <a:bodyPr>
+            <a:normAutofit fontScale="90000"/>
+          </a:bodyPr>
+          <a:lstStyle/>
+          <a:p>
+            <a:r>
+              <a:rPr lang="de-DE" dirty="0"/>
+              <a:t>Drittanbieter - Software</a:t>
+            </a:r>
+          </a:p>
+        </p:txBody>
+      </p:sp>
+      <p:sp>
+        <p:nvSpPr>
+          <p:cNvPr id="3" name="Inhaltsplatzhalter 2"/>
+          <p:cNvSpPr>
+            <a:spLocks noGrp="1"/>
+          </p:cNvSpPr>
+          <p:nvPr>
+            <p:ph idx="1"/>
+          </p:nvPr>
+        </p:nvSpPr>
+        <p:spPr>
+          <a:xfrm>
+            <a:off x="866607" y="1244780"/>
+            <a:ext cx="10515600" cy="4351338"/>
+          </a:xfrm>
+        </p:spPr>
+        <p:txBody>
+          <a:bodyPr/>
+          <a:lstStyle/>
+          <a:p>
+            <a:r>
+              <a:rPr lang="de-DE" dirty="0" err="1" smtClean="0"/>
+              <a:t>JSmooth</a:t>
+            </a:r>
+            <a:endParaRPr lang="de-DE" dirty="0" smtClean="0"/>
+          </a:p>
+          <a:p>
+            <a:pPr>
+              <a:buNone/>
+            </a:pPr>
+            <a:r>
+              <a:rPr lang="de-DE" dirty="0" smtClean="0"/>
+              <a:t>Download link: </a:t>
+            </a:r>
+            <a:r>
+              <a:rPr lang="de-DE" dirty="0" smtClean="0">
+                <a:solidFill>
+                  <a:schemeClr val="accent1">
+                    <a:lumMod val="75000"/>
+                  </a:schemeClr>
+                </a:solidFill>
+              </a:rPr>
+              <a:t>http://jsmooth.sourceforge.net/download.php</a:t>
+            </a:r>
+            <a:endParaRPr lang="de-DE" dirty="0">
+              <a:solidFill>
+                <a:schemeClr val="accent1">
+                  <a:lumMod val="75000"/>
+                </a:schemeClr>
+              </a:solidFill>
+            </a:endParaRPr>
+          </a:p>
+        </p:txBody>
+      </p:sp>
+      <p:pic>
+        <p:nvPicPr>
+          <p:cNvPr id="4" name="Grafik 3"/>
+          <p:cNvPicPr>
+            <a:picLocks noChangeAspect="1"/>
+          </p:cNvPicPr>
+          <p:nvPr/>
+        </p:nvPicPr>
+        <p:blipFill>
+          <a:blip r:embed="rId2" cstate="print">
+            <a:extLst>
+              <a:ext uri="{28A0092B-C50C-407E-A947-70E740481C1C}">
+                <a14:useLocalDpi xmlns:a14="http://schemas.microsoft.com/office/drawing/2010/main" val="0"/>
+              </a:ext>
+            </a:extLst>
+          </a:blip>
+          <a:stretch>
+            <a:fillRect/>
+          </a:stretch>
+        </p:blipFill>
+        <p:spPr>
+          <a:xfrm>
+            <a:off x="17595" y="3325"/>
+            <a:ext cx="849012" cy="851140"/>
+          </a:xfrm>
+          <a:prstGeom prst="rect">
+            <a:avLst/>
+          </a:prstGeom>
+          <a:effectLst/>
+        </p:spPr>
+      </p:pic>
+      <p:cxnSp>
+        <p:nvCxnSpPr>
+          <p:cNvPr id="5" name="Gerader Verbinder 4"/>
+          <p:cNvCxnSpPr/>
+          <p:nvPr/>
+        </p:nvCxnSpPr>
+        <p:spPr>
+          <a:xfrm>
+            <a:off x="0" y="879893"/>
+            <a:ext cx="10668000" cy="0"/>
+          </a:xfrm>
+          <a:prstGeom prst="line">
+            <a:avLst/>
+          </a:prstGeom>
+        </p:spPr>
+        <p:style>
+          <a:lnRef idx="3">
+            <a:schemeClr val="accent2"/>
+          </a:lnRef>
+          <a:fillRef idx="0">
+            <a:schemeClr val="accent2"/>
+          </a:fillRef>
+          <a:effectRef idx="2">
+            <a:schemeClr val="accent2"/>
+          </a:effectRef>
+          <a:fontRef idx="minor">
+            <a:schemeClr val="tx1"/>
+          </a:fontRef>
+        </p:style>
+      </p:cxnSp>
+      <p:cxnSp>
+        <p:nvCxnSpPr>
+          <p:cNvPr id="6" name="Gerader Verbinder 5"/>
+          <p:cNvCxnSpPr/>
+          <p:nvPr/>
+        </p:nvCxnSpPr>
+        <p:spPr>
+          <a:xfrm>
+            <a:off x="1524000" y="6311660"/>
+            <a:ext cx="10668000" cy="0"/>
+          </a:xfrm>
+          <a:prstGeom prst="line">
+            <a:avLst/>
+          </a:prstGeom>
+        </p:spPr>
+        <p:style>
+          <a:lnRef idx="3">
+            <a:schemeClr val="accent2"/>
+          </a:lnRef>
+          <a:fillRef idx="0">
+            <a:schemeClr val="accent2"/>
+          </a:fillRef>
+          <a:effectRef idx="2">
+            <a:schemeClr val="accent2"/>
+          </a:effectRef>
+          <a:fontRef idx="minor">
+            <a:schemeClr val="tx1"/>
+          </a:fontRef>
+        </p:style>
+      </p:cxnSp>
+      <p:pic>
+        <p:nvPicPr>
+          <p:cNvPr id="1026" name="Picture 2" descr="C:\Users\Serhiy\Desktop\download.png"/>
+          <p:cNvPicPr>
+            <a:picLocks noChangeAspect="1" noChangeArrowheads="1"/>
+          </p:cNvPicPr>
+          <p:nvPr/>
+        </p:nvPicPr>
+        <p:blipFill>
+          <a:blip r:embed="rId3" cstate="print"/>
+          <a:srcRect/>
+          <a:stretch>
+            <a:fillRect/>
+          </a:stretch>
+        </p:blipFill>
+        <p:spPr bwMode="auto">
+          <a:xfrm>
+            <a:off x="8210062" y="2773973"/>
+            <a:ext cx="1962150" cy="781050"/>
+          </a:xfrm>
+          <a:prstGeom prst="rect">
+            <a:avLst/>
+          </a:prstGeom>
+          <a:noFill/>
+        </p:spPr>
+      </p:pic>
+    </p:spTree>
+    <p:extLst>
+      <p:ext uri="{BB962C8B-B14F-4D97-AF65-F5344CB8AC3E}">
+        <p14:creationId xmlns:p14="http://schemas.microsoft.com/office/powerpoint/2010/main" val="1925289598"/>
+      </p:ext>
+    </p:extLst>
+  </p:cSld>
+  <p:clrMapOvr>
+    <a:masterClrMapping/>
+  </p:clrMapOvr>
+  <p:timing>
+    <p:tnLst>
+      <p:par>
+        <p:cTn id="1" dur="indefinite" restart="never" nodeType="tmRoot"/>
+      </p:par>
+    </p:tnLst>
+  </p:timing>
+</p:sld>
+</file>
+
+<file path=ppt/slides/slide18.xml><?xml version="1.0" encoding="utf-8"?>
+<p:sld xmlns:a="http://schemas.openxmlformats.org/drawingml/2006/main" xmlns:r="http://schemas.openxmlformats.org/officeDocument/2006/relationships" xmlns:p="http://schemas.openxmlformats.org/presentationml/2006/main">
+  <p:cSld>
+    <p:spTree>
+      <p:nvGrpSpPr>
+        <p:cNvPr id="1" name=""/>
+        <p:cNvGrpSpPr/>
+        <p:nvPr/>
+      </p:nvGrpSpPr>
+      <p:grpSpPr>
+        <a:xfrm>
+          <a:off x="0" y="0"/>
+          <a:ext cx="0" cy="0"/>
+          <a:chOff x="0" y="0"/>
+          <a:chExt cx="0" cy="0"/>
+        </a:xfrm>
+      </p:grpSpPr>
+      <p:sp>
+        <p:nvSpPr>
+          <p:cNvPr id="2" name="Заголовок 1"/>
+          <p:cNvSpPr>
+            <a:spLocks noGrp="1"/>
+          </p:cNvSpPr>
+          <p:nvPr>
+            <p:ph type="title"/>
+          </p:nvPr>
+        </p:nvSpPr>
+        <p:spPr>
+          <a:solidFill>
+            <a:schemeClr val="tx2">
+              <a:lumMod val="20000"/>
+              <a:lumOff val="80000"/>
+            </a:schemeClr>
+          </a:solidFill>
+        </p:spPr>
+        <p:txBody>
+          <a:bodyPr>
+            <a:normAutofit fontScale="90000"/>
+          </a:bodyPr>
+          <a:lstStyle/>
+          <a:p>
+            <a:r>
+              <a:rPr lang="de-DE" dirty="0" smtClean="0"/>
+              <a:t/>
+            </a:r>
+            <a:br>
+              <a:rPr lang="de-DE" dirty="0" smtClean="0"/>
+            </a:br>
+            <a:r>
+              <a:rPr lang="de-DE" dirty="0" smtClean="0"/>
+              <a:t> </a:t>
+            </a:r>
+            <a:r>
+              <a:rPr lang="de-DE" dirty="0" smtClean="0">
+                <a:solidFill>
+                  <a:srgbClr val="183BD2"/>
+                </a:solidFill>
+              </a:rPr>
+              <a:t>Drittanbieter-Software(1)	</a:t>
+            </a:r>
+            <a:r>
+              <a:rPr lang="de-DE" dirty="0" smtClean="0"/>
+              <a:t/>
+            </a:r>
+            <a:br>
+              <a:rPr lang="de-DE" dirty="0" smtClean="0"/>
+            </a:br>
+            <a:endParaRPr lang="de-DE" dirty="0"/>
+          </a:p>
+        </p:txBody>
+      </p:sp>
+      <p:sp>
+        <p:nvSpPr>
+          <p:cNvPr id="3" name="Содержимое 2"/>
+          <p:cNvSpPr>
+            <a:spLocks noGrp="1"/>
+          </p:cNvSpPr>
+          <p:nvPr>
+            <p:ph idx="1"/>
+          </p:nvPr>
+        </p:nvSpPr>
+        <p:spPr/>
+        <p:txBody>
+          <a:bodyPr/>
+          <a:lstStyle/>
+          <a:p>
+            <a:r>
+              <a:rPr lang="de-DE" dirty="0" err="1" smtClean="0"/>
+              <a:t>JSmooth</a:t>
+            </a:r>
+            <a:endParaRPr lang="de-DE" dirty="0"/>
+          </a:p>
+        </p:txBody>
+      </p:sp>
+      <p:pic>
+        <p:nvPicPr>
+          <p:cNvPr id="4098" name="Picture 2" descr="C:\Users\Serhiy\Desktop\SE\jsmooth1.png"/>
+          <p:cNvPicPr>
+            <a:picLocks noChangeAspect="1" noChangeArrowheads="1"/>
+          </p:cNvPicPr>
+          <p:nvPr/>
+        </p:nvPicPr>
+        <p:blipFill>
+          <a:blip r:embed="rId2" cstate="print"/>
+          <a:srcRect/>
+          <a:stretch>
+            <a:fillRect/>
+          </a:stretch>
+        </p:blipFill>
+        <p:spPr bwMode="auto">
+          <a:xfrm>
+            <a:off x="2063552" y="2420888"/>
+            <a:ext cx="8663517" cy="3810000"/>
+          </a:xfrm>
+          <a:prstGeom prst="rect">
+            <a:avLst/>
+          </a:prstGeom>
+          <a:noFill/>
+        </p:spPr>
+      </p:pic>
+    </p:spTree>
+  </p:cSld>
+  <p:clrMapOvr>
+    <a:masterClrMapping/>
+  </p:clrMapOvr>
+  <p:timing>
+    <p:tnLst>
+      <p:par>
+        <p:cTn id="1" dur="indefinite" restart="never" nodeType="tmRoot"/>
+      </p:par>
+    </p:tnLst>
+  </p:timing>
+</p:sld>
+</file>
+
+<file path=ppt/slides/slide19.xml><?xml version="1.0" encoding="utf-8"?>
+<p:sld xmlns:a="http://schemas.openxmlformats.org/drawingml/2006/main" xmlns:r="http://schemas.openxmlformats.org/officeDocument/2006/relationships" xmlns:p="http://schemas.openxmlformats.org/presentationml/2006/main">
+  <p:cSld>
+    <p:spTree>
+      <p:nvGrpSpPr>
+        <p:cNvPr id="1" name=""/>
+        <p:cNvGrpSpPr/>
+        <p:nvPr/>
+      </p:nvGrpSpPr>
+      <p:grpSpPr>
+        <a:xfrm>
+          <a:off x="0" y="0"/>
+          <a:ext cx="0" cy="0"/>
+          <a:chOff x="0" y="0"/>
+          <a:chExt cx="0" cy="0"/>
+        </a:xfrm>
+      </p:grpSpPr>
+      <p:pic>
+        <p:nvPicPr>
+          <p:cNvPr id="5" name="Содержимое 4" descr="jsmooth1p5.png"/>
+          <p:cNvPicPr>
+            <a:picLocks noGrp="1" noChangeAspect="1"/>
+          </p:cNvPicPr>
+          <p:nvPr>
+            <p:ph idx="1"/>
+          </p:nvPr>
+        </p:nvPicPr>
+        <p:blipFill>
+          <a:blip r:embed="rId2" cstate="print"/>
+          <a:stretch>
+            <a:fillRect/>
+          </a:stretch>
+        </p:blipFill>
+        <p:spPr>
+          <a:xfrm>
+            <a:off x="2298515" y="1835335"/>
+            <a:ext cx="7594971" cy="4525963"/>
+          </a:xfrm>
+        </p:spPr>
+      </p:pic>
+      <p:sp>
+        <p:nvSpPr>
+          <p:cNvPr id="6" name="Заголовок 1"/>
+          <p:cNvSpPr>
+            <a:spLocks noGrp="1"/>
+          </p:cNvSpPr>
+          <p:nvPr>
+            <p:ph type="title"/>
+          </p:nvPr>
+        </p:nvSpPr>
+        <p:spPr>
+          <a:solidFill>
+            <a:schemeClr val="tx2">
+              <a:lumMod val="20000"/>
+              <a:lumOff val="80000"/>
+            </a:schemeClr>
+          </a:solidFill>
+        </p:spPr>
+        <p:txBody>
+          <a:bodyPr>
+            <a:normAutofit fontScale="90000"/>
+          </a:bodyPr>
+          <a:lstStyle/>
+          <a:p>
+            <a:r>
+              <a:rPr lang="de-DE" dirty="0" smtClean="0"/>
+              <a:t/>
+            </a:r>
+            <a:br>
+              <a:rPr lang="de-DE" dirty="0" smtClean="0"/>
+            </a:br>
+            <a:r>
+              <a:rPr lang="de-DE" dirty="0" smtClean="0"/>
+              <a:t> </a:t>
+            </a:r>
+            <a:r>
+              <a:rPr lang="de-DE" dirty="0" smtClean="0">
+                <a:solidFill>
+                  <a:srgbClr val="183BD2"/>
+                </a:solidFill>
+              </a:rPr>
+              <a:t>Drittanbieter-Software(2)	</a:t>
+            </a:r>
+            <a:r>
+              <a:rPr lang="de-DE" dirty="0" smtClean="0"/>
+              <a:t/>
+            </a:r>
+            <a:br>
+              <a:rPr lang="de-DE" dirty="0" smtClean="0"/>
+            </a:br>
+            <a:endParaRPr lang="de-DE" dirty="0"/>
+          </a:p>
+        </p:txBody>
+      </p:sp>
+    </p:spTree>
+  </p:cSld>
+  <p:clrMapOvr>
+    <a:masterClrMapping/>
+  </p:clrMapOvr>
+  <p:timing>
+    <p:tnLst>
+      <p:par>
+        <p:cTn id="1" dur="indefinite" restart="never" nodeType="tmRoot"/>
+      </p:par>
+    </p:tnLst>
+  </p:timing>
 </p:sld>
 </file>
 
@@ -3493,6 +5456,739 @@
   <p:clrMapOvr>
     <a:masterClrMapping/>
   </p:clrMapOvr>
+  <p:timing>
+    <p:tnLst>
+      <p:par>
+        <p:cTn id="1" dur="indefinite" restart="never" nodeType="tmRoot"/>
+      </p:par>
+    </p:tnLst>
+  </p:timing>
+</p:sld>
+</file>
+
+<file path=ppt/slides/slide20.xml><?xml version="1.0" encoding="utf-8"?>
+<p:sld xmlns:a="http://schemas.openxmlformats.org/drawingml/2006/main" xmlns:r="http://schemas.openxmlformats.org/officeDocument/2006/relationships" xmlns:p="http://schemas.openxmlformats.org/presentationml/2006/main">
+  <p:cSld>
+    <p:spTree>
+      <p:nvGrpSpPr>
+        <p:cNvPr id="1" name=""/>
+        <p:cNvGrpSpPr/>
+        <p:nvPr/>
+      </p:nvGrpSpPr>
+      <p:grpSpPr>
+        <a:xfrm>
+          <a:off x="0" y="0"/>
+          <a:ext cx="0" cy="0"/>
+          <a:chOff x="0" y="0"/>
+          <a:chExt cx="0" cy="0"/>
+        </a:xfrm>
+      </p:grpSpPr>
+      <p:pic>
+        <p:nvPicPr>
+          <p:cNvPr id="5" name="Содержимое 4" descr="jsmooth1p6.png"/>
+          <p:cNvPicPr>
+            <a:picLocks noGrp="1" noChangeAspect="1"/>
+          </p:cNvPicPr>
+          <p:nvPr>
+            <p:ph idx="1"/>
+          </p:nvPr>
+        </p:nvPicPr>
+        <p:blipFill>
+          <a:blip r:embed="rId2" cstate="print"/>
+          <a:stretch>
+            <a:fillRect/>
+          </a:stretch>
+        </p:blipFill>
+        <p:spPr>
+          <a:xfrm>
+            <a:off x="2298515" y="1835335"/>
+            <a:ext cx="7594971" cy="4525963"/>
+          </a:xfrm>
+        </p:spPr>
+      </p:pic>
+      <p:sp>
+        <p:nvSpPr>
+          <p:cNvPr id="4" name="Заголовок 1"/>
+          <p:cNvSpPr>
+            <a:spLocks noGrp="1"/>
+          </p:cNvSpPr>
+          <p:nvPr>
+            <p:ph type="title"/>
+          </p:nvPr>
+        </p:nvSpPr>
+        <p:spPr>
+          <a:solidFill>
+            <a:schemeClr val="tx2">
+              <a:lumMod val="20000"/>
+              <a:lumOff val="80000"/>
+            </a:schemeClr>
+          </a:solidFill>
+        </p:spPr>
+        <p:txBody>
+          <a:bodyPr>
+            <a:normAutofit fontScale="90000"/>
+          </a:bodyPr>
+          <a:lstStyle/>
+          <a:p>
+            <a:r>
+              <a:rPr lang="de-DE" dirty="0" smtClean="0"/>
+              <a:t/>
+            </a:r>
+            <a:br>
+              <a:rPr lang="de-DE" dirty="0" smtClean="0"/>
+            </a:br>
+            <a:r>
+              <a:rPr lang="de-DE" dirty="0" smtClean="0"/>
+              <a:t> </a:t>
+            </a:r>
+            <a:r>
+              <a:rPr lang="de-DE" dirty="0" smtClean="0">
+                <a:solidFill>
+                  <a:srgbClr val="183BD2"/>
+                </a:solidFill>
+              </a:rPr>
+              <a:t>Drittanbieter-Software(3)	</a:t>
+            </a:r>
+            <a:r>
+              <a:rPr lang="de-DE" dirty="0" smtClean="0"/>
+              <a:t/>
+            </a:r>
+            <a:br>
+              <a:rPr lang="de-DE" dirty="0" smtClean="0"/>
+            </a:br>
+            <a:endParaRPr lang="de-DE" dirty="0"/>
+          </a:p>
+        </p:txBody>
+      </p:sp>
+    </p:spTree>
+  </p:cSld>
+  <p:clrMapOvr>
+    <a:masterClrMapping/>
+  </p:clrMapOvr>
+  <p:timing>
+    <p:tnLst>
+      <p:par>
+        <p:cTn id="1" dur="indefinite" restart="never" nodeType="tmRoot"/>
+      </p:par>
+    </p:tnLst>
+  </p:timing>
+</p:sld>
+</file>
+
+<file path=ppt/slides/slide21.xml><?xml version="1.0" encoding="utf-8"?>
+<p:sld xmlns:a="http://schemas.openxmlformats.org/drawingml/2006/main" xmlns:r="http://schemas.openxmlformats.org/officeDocument/2006/relationships" xmlns:p="http://schemas.openxmlformats.org/presentationml/2006/main">
+  <p:cSld>
+    <p:spTree>
+      <p:nvGrpSpPr>
+        <p:cNvPr id="1" name=""/>
+        <p:cNvGrpSpPr/>
+        <p:nvPr/>
+      </p:nvGrpSpPr>
+      <p:grpSpPr>
+        <a:xfrm>
+          <a:off x="0" y="0"/>
+          <a:ext cx="0" cy="0"/>
+          <a:chOff x="0" y="0"/>
+          <a:chExt cx="0" cy="0"/>
+        </a:xfrm>
+      </p:grpSpPr>
+      <p:sp>
+        <p:nvSpPr>
+          <p:cNvPr id="4" name="Заголовок 1"/>
+          <p:cNvSpPr>
+            <a:spLocks noGrp="1"/>
+          </p:cNvSpPr>
+          <p:nvPr>
+            <p:ph type="title"/>
+          </p:nvPr>
+        </p:nvSpPr>
+        <p:spPr>
+          <a:solidFill>
+            <a:schemeClr val="tx2">
+              <a:lumMod val="20000"/>
+              <a:lumOff val="80000"/>
+            </a:schemeClr>
+          </a:solidFill>
+        </p:spPr>
+        <p:txBody>
+          <a:bodyPr>
+            <a:normAutofit fontScale="90000"/>
+          </a:bodyPr>
+          <a:lstStyle/>
+          <a:p>
+            <a:r>
+              <a:rPr lang="de-DE" dirty="0" smtClean="0"/>
+              <a:t/>
+            </a:r>
+            <a:br>
+              <a:rPr lang="de-DE" dirty="0" smtClean="0"/>
+            </a:br>
+            <a:r>
+              <a:rPr lang="de-DE" dirty="0" smtClean="0"/>
+              <a:t> </a:t>
+            </a:r>
+            <a:r>
+              <a:rPr lang="de-DE" dirty="0" smtClean="0">
+                <a:solidFill>
+                  <a:srgbClr val="183BD2"/>
+                </a:solidFill>
+              </a:rPr>
+              <a:t>Drittanbieter-Software(4)	</a:t>
+            </a:r>
+            <a:r>
+              <a:rPr lang="de-DE" dirty="0" smtClean="0"/>
+              <a:t/>
+            </a:r>
+            <a:br>
+              <a:rPr lang="de-DE" dirty="0" smtClean="0"/>
+            </a:br>
+            <a:endParaRPr lang="de-DE" dirty="0"/>
+          </a:p>
+        </p:txBody>
+      </p:sp>
+      <p:pic>
+        <p:nvPicPr>
+          <p:cNvPr id="7" name="Содержимое 6" descr="jsmooth2.png"/>
+          <p:cNvPicPr>
+            <a:picLocks noGrp="1" noChangeAspect="1"/>
+          </p:cNvPicPr>
+          <p:nvPr>
+            <p:ph idx="1"/>
+          </p:nvPr>
+        </p:nvPicPr>
+        <p:blipFill>
+          <a:blip r:embed="rId2" cstate="print"/>
+          <a:stretch>
+            <a:fillRect/>
+          </a:stretch>
+        </p:blipFill>
+        <p:spPr>
+          <a:xfrm>
+            <a:off x="2056836" y="1967443"/>
+            <a:ext cx="8078328" cy="3791479"/>
+          </a:xfrm>
+        </p:spPr>
+      </p:pic>
+    </p:spTree>
+  </p:cSld>
+  <p:clrMapOvr>
+    <a:masterClrMapping/>
+  </p:clrMapOvr>
+  <p:timing>
+    <p:tnLst>
+      <p:par>
+        <p:cTn id="1" dur="indefinite" restart="never" nodeType="tmRoot"/>
+      </p:par>
+    </p:tnLst>
+  </p:timing>
+</p:sld>
+</file>
+
+<file path=ppt/slides/slide22.xml><?xml version="1.0" encoding="utf-8"?>
+<p:sld xmlns:a="http://schemas.openxmlformats.org/drawingml/2006/main" xmlns:r="http://schemas.openxmlformats.org/officeDocument/2006/relationships" xmlns:p="http://schemas.openxmlformats.org/presentationml/2006/main">
+  <p:cSld>
+    <p:spTree>
+      <p:nvGrpSpPr>
+        <p:cNvPr id="1" name=""/>
+        <p:cNvGrpSpPr/>
+        <p:nvPr/>
+      </p:nvGrpSpPr>
+      <p:grpSpPr>
+        <a:xfrm>
+          <a:off x="0" y="0"/>
+          <a:ext cx="0" cy="0"/>
+          <a:chOff x="0" y="0"/>
+          <a:chExt cx="0" cy="0"/>
+        </a:xfrm>
+      </p:grpSpPr>
+      <p:pic>
+        <p:nvPicPr>
+          <p:cNvPr id="5" name="Содержимое 4" descr="jsmooth3.png"/>
+          <p:cNvPicPr>
+            <a:picLocks noGrp="1" noChangeAspect="1"/>
+          </p:cNvPicPr>
+          <p:nvPr>
+            <p:ph idx="1"/>
+          </p:nvPr>
+        </p:nvPicPr>
+        <p:blipFill>
+          <a:blip r:embed="rId2" cstate="print"/>
+          <a:stretch>
+            <a:fillRect/>
+          </a:stretch>
+        </p:blipFill>
+        <p:spPr>
+          <a:xfrm>
+            <a:off x="2198643" y="1783083"/>
+            <a:ext cx="7794715" cy="4525963"/>
+          </a:xfrm>
+        </p:spPr>
+      </p:pic>
+      <p:sp>
+        <p:nvSpPr>
+          <p:cNvPr id="4" name="Заголовок 1"/>
+          <p:cNvSpPr>
+            <a:spLocks noGrp="1"/>
+          </p:cNvSpPr>
+          <p:nvPr>
+            <p:ph type="title"/>
+          </p:nvPr>
+        </p:nvSpPr>
+        <p:spPr>
+          <a:solidFill>
+            <a:schemeClr val="tx2">
+              <a:lumMod val="20000"/>
+              <a:lumOff val="80000"/>
+            </a:schemeClr>
+          </a:solidFill>
+        </p:spPr>
+        <p:txBody>
+          <a:bodyPr>
+            <a:normAutofit fontScale="90000"/>
+          </a:bodyPr>
+          <a:lstStyle/>
+          <a:p>
+            <a:r>
+              <a:rPr lang="de-DE" dirty="0" smtClean="0"/>
+              <a:t/>
+            </a:r>
+            <a:br>
+              <a:rPr lang="de-DE" dirty="0" smtClean="0"/>
+            </a:br>
+            <a:r>
+              <a:rPr lang="de-DE" dirty="0" smtClean="0"/>
+              <a:t> </a:t>
+            </a:r>
+            <a:r>
+              <a:rPr lang="de-DE" dirty="0" smtClean="0">
+                <a:solidFill>
+                  <a:srgbClr val="183BD2"/>
+                </a:solidFill>
+              </a:rPr>
+              <a:t>Drittanbieter-Software(5)	</a:t>
+            </a:r>
+            <a:r>
+              <a:rPr lang="de-DE" dirty="0" smtClean="0"/>
+              <a:t/>
+            </a:r>
+            <a:br>
+              <a:rPr lang="de-DE" dirty="0" smtClean="0"/>
+            </a:br>
+            <a:endParaRPr lang="de-DE" dirty="0"/>
+          </a:p>
+        </p:txBody>
+      </p:sp>
+    </p:spTree>
+  </p:cSld>
+  <p:clrMapOvr>
+    <a:masterClrMapping/>
+  </p:clrMapOvr>
+  <p:timing>
+    <p:tnLst>
+      <p:par>
+        <p:cTn id="1" dur="indefinite" restart="never" nodeType="tmRoot"/>
+      </p:par>
+    </p:tnLst>
+  </p:timing>
+</p:sld>
+</file>
+
+<file path=ppt/slides/slide23.xml><?xml version="1.0" encoding="utf-8"?>
+<p:sld xmlns:a="http://schemas.openxmlformats.org/drawingml/2006/main" xmlns:r="http://schemas.openxmlformats.org/officeDocument/2006/relationships" xmlns:p="http://schemas.openxmlformats.org/presentationml/2006/main">
+  <p:cSld>
+    <p:spTree>
+      <p:nvGrpSpPr>
+        <p:cNvPr id="1" name=""/>
+        <p:cNvGrpSpPr/>
+        <p:nvPr/>
+      </p:nvGrpSpPr>
+      <p:grpSpPr>
+        <a:xfrm>
+          <a:off x="0" y="0"/>
+          <a:ext cx="0" cy="0"/>
+          <a:chOff x="0" y="0"/>
+          <a:chExt cx="0" cy="0"/>
+        </a:xfrm>
+      </p:grpSpPr>
+      <p:pic>
+        <p:nvPicPr>
+          <p:cNvPr id="5" name="Содержимое 4" descr="jsmooth4.png"/>
+          <p:cNvPicPr>
+            <a:picLocks noGrp="1" noChangeAspect="1"/>
+          </p:cNvPicPr>
+          <p:nvPr>
+            <p:ph idx="1"/>
+          </p:nvPr>
+        </p:nvPicPr>
+        <p:blipFill>
+          <a:blip r:embed="rId2" cstate="print"/>
+          <a:stretch>
+            <a:fillRect/>
+          </a:stretch>
+        </p:blipFill>
+        <p:spPr>
+          <a:xfrm>
+            <a:off x="2298515" y="1809209"/>
+            <a:ext cx="7594971" cy="4525963"/>
+          </a:xfrm>
+        </p:spPr>
+      </p:pic>
+      <p:sp>
+        <p:nvSpPr>
+          <p:cNvPr id="4" name="Заголовок 1"/>
+          <p:cNvSpPr>
+            <a:spLocks noGrp="1"/>
+          </p:cNvSpPr>
+          <p:nvPr>
+            <p:ph type="title"/>
+          </p:nvPr>
+        </p:nvSpPr>
+        <p:spPr>
+          <a:solidFill>
+            <a:schemeClr val="tx2">
+              <a:lumMod val="20000"/>
+              <a:lumOff val="80000"/>
+            </a:schemeClr>
+          </a:solidFill>
+        </p:spPr>
+        <p:txBody>
+          <a:bodyPr>
+            <a:normAutofit fontScale="90000"/>
+          </a:bodyPr>
+          <a:lstStyle/>
+          <a:p>
+            <a:r>
+              <a:rPr lang="de-DE" dirty="0" smtClean="0"/>
+              <a:t/>
+            </a:r>
+            <a:br>
+              <a:rPr lang="de-DE" dirty="0" smtClean="0"/>
+            </a:br>
+            <a:r>
+              <a:rPr lang="de-DE" dirty="0" smtClean="0"/>
+              <a:t> </a:t>
+            </a:r>
+            <a:r>
+              <a:rPr lang="de-DE" dirty="0" smtClean="0">
+                <a:solidFill>
+                  <a:srgbClr val="183BD2"/>
+                </a:solidFill>
+              </a:rPr>
+              <a:t>Drittanbieter-Software(6)	</a:t>
+            </a:r>
+            <a:r>
+              <a:rPr lang="de-DE" dirty="0" smtClean="0"/>
+              <a:t/>
+            </a:r>
+            <a:br>
+              <a:rPr lang="de-DE" dirty="0" smtClean="0"/>
+            </a:br>
+            <a:endParaRPr lang="de-DE" dirty="0"/>
+          </a:p>
+        </p:txBody>
+      </p:sp>
+    </p:spTree>
+  </p:cSld>
+  <p:clrMapOvr>
+    <a:masterClrMapping/>
+  </p:clrMapOvr>
+  <p:timing>
+    <p:tnLst>
+      <p:par>
+        <p:cTn id="1" dur="indefinite" restart="never" nodeType="tmRoot"/>
+      </p:par>
+    </p:tnLst>
+  </p:timing>
+</p:sld>
+</file>
+
+<file path=ppt/slides/slide24.xml><?xml version="1.0" encoding="utf-8"?>
+<p:sld xmlns:a="http://schemas.openxmlformats.org/drawingml/2006/main" xmlns:r="http://schemas.openxmlformats.org/officeDocument/2006/relationships" xmlns:p="http://schemas.openxmlformats.org/presentationml/2006/main">
+  <p:cSld>
+    <p:spTree>
+      <p:nvGrpSpPr>
+        <p:cNvPr id="1" name=""/>
+        <p:cNvGrpSpPr/>
+        <p:nvPr/>
+      </p:nvGrpSpPr>
+      <p:grpSpPr>
+        <a:xfrm>
+          <a:off x="0" y="0"/>
+          <a:ext cx="0" cy="0"/>
+          <a:chOff x="0" y="0"/>
+          <a:chExt cx="0" cy="0"/>
+        </a:xfrm>
+      </p:grpSpPr>
+      <p:sp>
+        <p:nvSpPr>
+          <p:cNvPr id="4" name="Заголовок 1"/>
+          <p:cNvSpPr>
+            <a:spLocks noGrp="1"/>
+          </p:cNvSpPr>
+          <p:nvPr>
+            <p:ph type="title"/>
+          </p:nvPr>
+        </p:nvSpPr>
+        <p:spPr>
+          <a:solidFill>
+            <a:schemeClr val="tx2">
+              <a:lumMod val="20000"/>
+              <a:lumOff val="80000"/>
+            </a:schemeClr>
+          </a:solidFill>
+        </p:spPr>
+        <p:txBody>
+          <a:bodyPr>
+            <a:normAutofit fontScale="90000"/>
+          </a:bodyPr>
+          <a:lstStyle/>
+          <a:p>
+            <a:r>
+              <a:rPr lang="de-DE" dirty="0" smtClean="0"/>
+              <a:t/>
+            </a:r>
+            <a:br>
+              <a:rPr lang="de-DE" dirty="0" smtClean="0"/>
+            </a:br>
+            <a:r>
+              <a:rPr lang="de-DE" dirty="0" smtClean="0"/>
+              <a:t> </a:t>
+            </a:r>
+            <a:r>
+              <a:rPr lang="de-DE" dirty="0" smtClean="0">
+                <a:solidFill>
+                  <a:srgbClr val="183BD2"/>
+                </a:solidFill>
+              </a:rPr>
+              <a:t>Drittanbieter-Software(7)	</a:t>
+            </a:r>
+            <a:r>
+              <a:rPr lang="de-DE" dirty="0" smtClean="0"/>
+              <a:t/>
+            </a:r>
+            <a:br>
+              <a:rPr lang="de-DE" dirty="0" smtClean="0"/>
+            </a:br>
+            <a:endParaRPr lang="de-DE" dirty="0"/>
+          </a:p>
+        </p:txBody>
+      </p:sp>
+      <p:pic>
+        <p:nvPicPr>
+          <p:cNvPr id="7" name="Содержимое 6" descr="5.png"/>
+          <p:cNvPicPr>
+            <a:picLocks noGrp="1" noChangeAspect="1"/>
+          </p:cNvPicPr>
+          <p:nvPr>
+            <p:ph idx="1"/>
+          </p:nvPr>
+        </p:nvPicPr>
+        <p:blipFill>
+          <a:blip r:embed="rId2" cstate="print"/>
+          <a:stretch>
+            <a:fillRect/>
+          </a:stretch>
+        </p:blipFill>
+        <p:spPr>
+          <a:xfrm>
+            <a:off x="875212" y="1770020"/>
+            <a:ext cx="10450285" cy="4525963"/>
+          </a:xfrm>
+        </p:spPr>
+      </p:pic>
+    </p:spTree>
+  </p:cSld>
+  <p:clrMapOvr>
+    <a:masterClrMapping/>
+  </p:clrMapOvr>
+  <p:timing>
+    <p:tnLst>
+      <p:par>
+        <p:cTn id="1" dur="indefinite" restart="never" nodeType="tmRoot"/>
+      </p:par>
+    </p:tnLst>
+  </p:timing>
+</p:sld>
+</file>
+
+<file path=ppt/slides/slide25.xml><?xml version="1.0" encoding="utf-8"?>
+<p:sld xmlns:a="http://schemas.openxmlformats.org/drawingml/2006/main" xmlns:r="http://schemas.openxmlformats.org/officeDocument/2006/relationships" xmlns:p="http://schemas.openxmlformats.org/presentationml/2006/main">
+  <p:cSld>
+    <p:spTree>
+      <p:nvGrpSpPr>
+        <p:cNvPr id="1" name=""/>
+        <p:cNvGrpSpPr/>
+        <p:nvPr/>
+      </p:nvGrpSpPr>
+      <p:grpSpPr>
+        <a:xfrm>
+          <a:off x="0" y="0"/>
+          <a:ext cx="0" cy="0"/>
+          <a:chOff x="0" y="0"/>
+          <a:chExt cx="0" cy="0"/>
+        </a:xfrm>
+      </p:grpSpPr>
+      <p:sp>
+        <p:nvSpPr>
+          <p:cNvPr id="2" name="Titel 1"/>
+          <p:cNvSpPr>
+            <a:spLocks noGrp="1"/>
+          </p:cNvSpPr>
+          <p:nvPr>
+            <p:ph type="title"/>
+          </p:nvPr>
+        </p:nvSpPr>
+        <p:spPr>
+          <a:xfrm>
+            <a:off x="866607" y="201371"/>
+            <a:ext cx="6126540" cy="690024"/>
+          </a:xfrm>
+        </p:spPr>
+        <p:txBody>
+          <a:bodyPr>
+            <a:normAutofit fontScale="90000"/>
+          </a:bodyPr>
+          <a:lstStyle/>
+          <a:p>
+            <a:r>
+              <a:rPr lang="de-DE" dirty="0"/>
+              <a:t>Selbstreflektion</a:t>
+            </a:r>
+          </a:p>
+        </p:txBody>
+      </p:sp>
+      <p:sp>
+        <p:nvSpPr>
+          <p:cNvPr id="3" name="Inhaltsplatzhalter 2"/>
+          <p:cNvSpPr>
+            <a:spLocks noGrp="1"/>
+          </p:cNvSpPr>
+          <p:nvPr>
+            <p:ph idx="1"/>
+          </p:nvPr>
+        </p:nvSpPr>
+        <p:spPr>
+          <a:xfrm>
+            <a:off x="866607" y="1244780"/>
+            <a:ext cx="10515600" cy="4351338"/>
+          </a:xfrm>
+        </p:spPr>
+        <p:txBody>
+          <a:bodyPr/>
+          <a:lstStyle/>
+          <a:p>
+            <a:endParaRPr lang="de-DE" dirty="0"/>
+          </a:p>
+        </p:txBody>
+      </p:sp>
+      <p:pic>
+        <p:nvPicPr>
+          <p:cNvPr id="4" name="Grafik 3"/>
+          <p:cNvPicPr>
+            <a:picLocks noChangeAspect="1"/>
+          </p:cNvPicPr>
+          <p:nvPr/>
+        </p:nvPicPr>
+        <p:blipFill>
+          <a:blip r:embed="rId2" cstate="print">
+            <a:extLst>
+              <a:ext uri="{28A0092B-C50C-407E-A947-70E740481C1C}">
+                <a14:useLocalDpi xmlns:a14="http://schemas.microsoft.com/office/drawing/2010/main" val="0"/>
+              </a:ext>
+            </a:extLst>
+          </a:blip>
+          <a:stretch>
+            <a:fillRect/>
+          </a:stretch>
+        </p:blipFill>
+        <p:spPr>
+          <a:xfrm>
+            <a:off x="17595" y="3325"/>
+            <a:ext cx="849012" cy="851140"/>
+          </a:xfrm>
+          <a:prstGeom prst="rect">
+            <a:avLst/>
+          </a:prstGeom>
+          <a:effectLst/>
+        </p:spPr>
+      </p:pic>
+      <p:cxnSp>
+        <p:nvCxnSpPr>
+          <p:cNvPr id="5" name="Gerader Verbinder 4"/>
+          <p:cNvCxnSpPr/>
+          <p:nvPr/>
+        </p:nvCxnSpPr>
+        <p:spPr>
+          <a:xfrm>
+            <a:off x="0" y="879893"/>
+            <a:ext cx="10668000" cy="0"/>
+          </a:xfrm>
+          <a:prstGeom prst="line">
+            <a:avLst/>
+          </a:prstGeom>
+        </p:spPr>
+        <p:style>
+          <a:lnRef idx="3">
+            <a:schemeClr val="accent2"/>
+          </a:lnRef>
+          <a:fillRef idx="0">
+            <a:schemeClr val="accent2"/>
+          </a:fillRef>
+          <a:effectRef idx="2">
+            <a:schemeClr val="accent2"/>
+          </a:effectRef>
+          <a:fontRef idx="minor">
+            <a:schemeClr val="tx1"/>
+          </a:fontRef>
+        </p:style>
+      </p:cxnSp>
+      <p:cxnSp>
+        <p:nvCxnSpPr>
+          <p:cNvPr id="6" name="Gerader Verbinder 5"/>
+          <p:cNvCxnSpPr/>
+          <p:nvPr/>
+        </p:nvCxnSpPr>
+        <p:spPr>
+          <a:xfrm>
+            <a:off x="1524000" y="6311660"/>
+            <a:ext cx="10668000" cy="0"/>
+          </a:xfrm>
+          <a:prstGeom prst="line">
+            <a:avLst/>
+          </a:prstGeom>
+        </p:spPr>
+        <p:style>
+          <a:lnRef idx="3">
+            <a:schemeClr val="accent2"/>
+          </a:lnRef>
+          <a:fillRef idx="0">
+            <a:schemeClr val="accent2"/>
+          </a:fillRef>
+          <a:effectRef idx="2">
+            <a:schemeClr val="accent2"/>
+          </a:effectRef>
+          <a:fontRef idx="minor">
+            <a:schemeClr val="tx1"/>
+          </a:fontRef>
+        </p:style>
+      </p:cxnSp>
+    </p:spTree>
+    <p:extLst>
+      <p:ext uri="{BB962C8B-B14F-4D97-AF65-F5344CB8AC3E}">
+        <p14:creationId xmlns:p14="http://schemas.microsoft.com/office/powerpoint/2010/main" val="4074636198"/>
+      </p:ext>
+    </p:extLst>
+  </p:cSld>
+  <p:clrMapOvr>
+    <a:masterClrMapping/>
+  </p:clrMapOvr>
+  <p:timing>
+    <p:tnLst>
+      <p:par>
+        <p:cTn id="1" dur="indefinite" restart="never" nodeType="tmRoot"/>
+      </p:par>
+    </p:tnLst>
+  </p:timing>
 </p:sld>
 </file>
 
@@ -3667,6 +6363,13 @@
   <p:clrMapOvr>
     <a:masterClrMapping/>
   </p:clrMapOvr>
+  <p:timing>
+    <p:tnLst>
+      <p:par>
+        <p:cTn id="1" dur="indefinite" restart="never" nodeType="tmRoot"/>
+      </p:par>
+    </p:tnLst>
+  </p:timing>
 </p:sld>
 </file>
 
@@ -3700,7 +6403,7 @@
         <p:spPr>
           <a:xfrm>
             <a:off x="866607" y="201371"/>
-            <a:ext cx="4878238" cy="690024"/>
+            <a:ext cx="8055324" cy="690024"/>
           </a:xfrm>
         </p:spPr>
         <p:txBody>
@@ -3711,31 +6414,201 @@
           <a:p>
             <a:r>
               <a:rPr lang="de-DE" dirty="0"/>
-              <a:t>UML - Diagramme</a:t>
-            </a:r>
-          </a:p>
-        </p:txBody>
-      </p:sp>
-      <p:sp>
-        <p:nvSpPr>
-          <p:cNvPr id="3" name="Inhaltsplatzhalter 2"/>
-          <p:cNvSpPr>
-            <a:spLocks noGrp="1"/>
-          </p:cNvSpPr>
+              <a:t>UML </a:t>
+            </a:r>
+            <a:r>
+              <a:rPr lang="de-DE" dirty="0" smtClean="0"/>
+              <a:t>– Diagramme via TOPCASED</a:t>
+            </a:r>
+            <a:endParaRPr lang="de-DE" dirty="0"/>
+          </a:p>
+        </p:txBody>
+      </p:sp>
+      <p:pic>
+        <p:nvPicPr>
+          <p:cNvPr id="7" name="Содержимое 6" descr="14 uml.png"/>
+          <p:cNvPicPr>
+            <a:picLocks noGrp="1" noChangeAspect="1"/>
+          </p:cNvPicPr>
           <p:nvPr>
             <p:ph idx="1"/>
           </p:nvPr>
-        </p:nvSpPr>
-        <p:spPr>
-          <a:xfrm>
-            <a:off x="866607" y="1244780"/>
-            <a:ext cx="10515600" cy="4351338"/>
-          </a:xfrm>
-        </p:spPr>
-        <p:txBody>
-          <a:bodyPr/>
-          <a:lstStyle/>
-          <a:p>
+        </p:nvPicPr>
+        <p:blipFill>
+          <a:blip r:embed="rId2" cstate="print"/>
+          <a:stretch>
+            <a:fillRect/>
+          </a:stretch>
+        </p:blipFill>
+        <p:spPr>
+          <a:xfrm>
+            <a:off x="2462670" y="1472650"/>
+            <a:ext cx="7323810" cy="3895238"/>
+          </a:xfrm>
+        </p:spPr>
+      </p:pic>
+      <p:pic>
+        <p:nvPicPr>
+          <p:cNvPr id="4" name="Grafik 3"/>
+          <p:cNvPicPr>
+            <a:picLocks noChangeAspect="1"/>
+          </p:cNvPicPr>
+          <p:nvPr/>
+        </p:nvPicPr>
+        <p:blipFill>
+          <a:blip r:embed="rId3" cstate="print">
+            <a:extLst>
+              <a:ext uri="{28A0092B-C50C-407E-A947-70E740481C1C}">
+                <a14:useLocalDpi xmlns:a14="http://schemas.microsoft.com/office/drawing/2010/main" val="0"/>
+              </a:ext>
+            </a:extLst>
+          </a:blip>
+          <a:stretch>
+            <a:fillRect/>
+          </a:stretch>
+        </p:blipFill>
+        <p:spPr>
+          <a:xfrm>
+            <a:off x="17595" y="3325"/>
+            <a:ext cx="849012" cy="851140"/>
+          </a:xfrm>
+          <a:prstGeom prst="rect">
+            <a:avLst/>
+          </a:prstGeom>
+          <a:effectLst/>
+        </p:spPr>
+      </p:pic>
+      <p:cxnSp>
+        <p:nvCxnSpPr>
+          <p:cNvPr id="5" name="Gerader Verbinder 4"/>
+          <p:cNvCxnSpPr/>
+          <p:nvPr/>
+        </p:nvCxnSpPr>
+        <p:spPr>
+          <a:xfrm>
+            <a:off x="0" y="879893"/>
+            <a:ext cx="10668000" cy="0"/>
+          </a:xfrm>
+          <a:prstGeom prst="line">
+            <a:avLst/>
+          </a:prstGeom>
+        </p:spPr>
+        <p:style>
+          <a:lnRef idx="3">
+            <a:schemeClr val="accent2"/>
+          </a:lnRef>
+          <a:fillRef idx="0">
+            <a:schemeClr val="accent2"/>
+          </a:fillRef>
+          <a:effectRef idx="2">
+            <a:schemeClr val="accent2"/>
+          </a:effectRef>
+          <a:fontRef idx="minor">
+            <a:schemeClr val="tx1"/>
+          </a:fontRef>
+        </p:style>
+      </p:cxnSp>
+      <p:cxnSp>
+        <p:nvCxnSpPr>
+          <p:cNvPr id="6" name="Gerader Verbinder 5"/>
+          <p:cNvCxnSpPr/>
+          <p:nvPr/>
+        </p:nvCxnSpPr>
+        <p:spPr>
+          <a:xfrm>
+            <a:off x="1524000" y="6311660"/>
+            <a:ext cx="10668000" cy="0"/>
+          </a:xfrm>
+          <a:prstGeom prst="line">
+            <a:avLst/>
+          </a:prstGeom>
+        </p:spPr>
+        <p:style>
+          <a:lnRef idx="3">
+            <a:schemeClr val="accent2"/>
+          </a:lnRef>
+          <a:fillRef idx="0">
+            <a:schemeClr val="accent2"/>
+          </a:fillRef>
+          <a:effectRef idx="2">
+            <a:schemeClr val="accent2"/>
+          </a:effectRef>
+          <a:fontRef idx="minor">
+            <a:schemeClr val="tx1"/>
+          </a:fontRef>
+        </p:style>
+      </p:cxnSp>
+    </p:spTree>
+    <p:extLst>
+      <p:ext uri="{BB962C8B-B14F-4D97-AF65-F5344CB8AC3E}">
+        <p14:creationId xmlns:p14="http://schemas.microsoft.com/office/powerpoint/2010/main" val="1787357985"/>
+      </p:ext>
+    </p:extLst>
+  </p:cSld>
+  <p:clrMapOvr>
+    <a:masterClrMapping/>
+  </p:clrMapOvr>
+  <p:timing>
+    <p:tnLst>
+      <p:par>
+        <p:cTn id="1" dur="indefinite" restart="never" nodeType="tmRoot"/>
+      </p:par>
+    </p:tnLst>
+  </p:timing>
+</p:sld>
+</file>
+
+<file path=ppt/slides/slide5.xml><?xml version="1.0" encoding="utf-8"?>
+<p:sld xmlns:a="http://schemas.openxmlformats.org/drawingml/2006/main" xmlns:r="http://schemas.openxmlformats.org/officeDocument/2006/relationships" xmlns:p="http://schemas.openxmlformats.org/presentationml/2006/main">
+  <p:cSld>
+    <p:spTree>
+      <p:nvGrpSpPr>
+        <p:cNvPr id="1" name=""/>
+        <p:cNvGrpSpPr/>
+        <p:nvPr/>
+      </p:nvGrpSpPr>
+      <p:grpSpPr>
+        <a:xfrm>
+          <a:off x="0" y="0"/>
+          <a:ext cx="0" cy="0"/>
+          <a:chOff x="0" y="0"/>
+          <a:chExt cx="0" cy="0"/>
+        </a:xfrm>
+      </p:grpSpPr>
+      <p:sp>
+        <p:nvSpPr>
+          <p:cNvPr id="2" name="Titel 1"/>
+          <p:cNvSpPr>
+            <a:spLocks noGrp="1"/>
+          </p:cNvSpPr>
+          <p:nvPr>
+            <p:ph type="title"/>
+          </p:nvPr>
+        </p:nvSpPr>
+        <p:spPr>
+          <a:xfrm>
+            <a:off x="866607" y="201371"/>
+            <a:ext cx="8055324" cy="690024"/>
+          </a:xfrm>
+        </p:spPr>
+        <p:txBody>
+          <a:bodyPr>
+            <a:normAutofit fontScale="90000"/>
+          </a:bodyPr>
+          <a:lstStyle/>
+          <a:p>
+            <a:r>
+              <a:rPr lang="de-DE" dirty="0"/>
+              <a:t>UML </a:t>
+            </a:r>
+            <a:r>
+              <a:rPr lang="de-DE" dirty="0" smtClean="0"/>
+              <a:t>– </a:t>
+            </a:r>
+            <a:r>
+              <a:rPr lang="de-DE" dirty="0" smtClean="0"/>
+              <a:t>Anwendungsfalldiagramm</a:t>
+            </a:r>
             <a:endParaRPr lang="de-DE" dirty="0"/>
           </a:p>
         </p:txBody>
@@ -3831,20 +6704,51 @@
           </a:fontRef>
         </p:style>
       </p:cxnSp>
+      <p:pic>
+        <p:nvPicPr>
+          <p:cNvPr id="8" name="Содержимое 3" descr="DezHexAnwendungsfalldiagramm.png"/>
+          <p:cNvPicPr>
+            <a:picLocks noChangeAspect="1"/>
+          </p:cNvPicPr>
+          <p:nvPr/>
+        </p:nvPicPr>
+        <p:blipFill>
+          <a:blip r:embed="rId3" cstate="print"/>
+          <a:stretch>
+            <a:fillRect/>
+          </a:stretch>
+        </p:blipFill>
+        <p:spPr>
+          <a:xfrm>
+            <a:off x="1524000" y="1089441"/>
+            <a:ext cx="8651924" cy="5110698"/>
+          </a:xfrm>
+          <a:prstGeom prst="rect">
+            <a:avLst/>
+          </a:prstGeom>
+        </p:spPr>
+      </p:pic>
     </p:spTree>
     <p:extLst>
       <p:ext uri="{BB962C8B-B14F-4D97-AF65-F5344CB8AC3E}">
-        <p14:creationId xmlns:p14="http://schemas.microsoft.com/office/powerpoint/2010/main" val="1787357985"/>
+        <p14:creationId xmlns:p14="http://schemas.microsoft.com/office/powerpoint/2010/main" val="3241636145"/>
       </p:ext>
     </p:extLst>
   </p:cSld>
   <p:clrMapOvr>
     <a:masterClrMapping/>
   </p:clrMapOvr>
+  <p:timing>
+    <p:tnLst>
+      <p:par>
+        <p:cTn id="1" dur="indefinite" restart="never" nodeType="tmRoot"/>
+      </p:par>
+    </p:tnLst>
+  </p:timing>
 </p:sld>
 </file>
 
-<file path=ppt/slides/slide5.xml><?xml version="1.0" encoding="utf-8"?>
+<file path=ppt/slides/slide6.xml><?xml version="1.0" encoding="utf-8"?>
 <p:sld xmlns:a="http://schemas.openxmlformats.org/drawingml/2006/main" xmlns:r="http://schemas.openxmlformats.org/officeDocument/2006/relationships" xmlns:p="http://schemas.openxmlformats.org/presentationml/2006/main">
   <p:cSld>
     <p:spTree>
@@ -3874,7 +6778,7 @@
         <p:spPr>
           <a:xfrm>
             <a:off x="866607" y="201371"/>
-            <a:ext cx="4878238" cy="690024"/>
+            <a:ext cx="8055324" cy="690024"/>
           </a:xfrm>
         </p:spPr>
         <p:txBody>
@@ -3885,31 +6789,16 @@
           <a:p>
             <a:r>
               <a:rPr lang="de-DE" dirty="0"/>
-              <a:t>Dokumentationen</a:t>
-            </a:r>
-          </a:p>
-        </p:txBody>
-      </p:sp>
-      <p:sp>
-        <p:nvSpPr>
-          <p:cNvPr id="3" name="Inhaltsplatzhalter 2"/>
-          <p:cNvSpPr>
-            <a:spLocks noGrp="1"/>
-          </p:cNvSpPr>
-          <p:nvPr>
-            <p:ph idx="1"/>
-          </p:nvPr>
-        </p:nvSpPr>
-        <p:spPr>
-          <a:xfrm>
-            <a:off x="866607" y="1244780"/>
-            <a:ext cx="10515600" cy="4351338"/>
-          </a:xfrm>
-        </p:spPr>
-        <p:txBody>
-          <a:bodyPr/>
-          <a:lstStyle/>
-          <a:p>
+              <a:t>UML </a:t>
+            </a:r>
+            <a:r>
+              <a:rPr lang="de-DE" dirty="0" smtClean="0"/>
+              <a:t>– </a:t>
+            </a:r>
+            <a:r>
+              <a:rPr lang="de-DE" dirty="0" smtClean="0"/>
+              <a:t>Aktivitätsdiagramm</a:t>
+            </a:r>
             <a:endParaRPr lang="de-DE" dirty="0"/>
           </a:p>
         </p:txBody>
@@ -4005,20 +6894,50 @@
           </a:fontRef>
         </p:style>
       </p:cxnSp>
+      <p:pic>
+        <p:nvPicPr>
+          <p:cNvPr id="7" name="Содержимое 3" descr="DezHexAktivitätsdiagramm.png"/>
+          <p:cNvPicPr>
+            <a:picLocks noGrp="1" noChangeAspect="1"/>
+          </p:cNvPicPr>
+          <p:nvPr>
+            <p:ph idx="1"/>
+          </p:nvPr>
+        </p:nvPicPr>
+        <p:blipFill>
+          <a:blip r:embed="rId3" cstate="print"/>
+          <a:stretch>
+            <a:fillRect/>
+          </a:stretch>
+        </p:blipFill>
+        <p:spPr>
+          <a:xfrm>
+            <a:off x="1524000" y="916823"/>
+            <a:ext cx="8428583" cy="5129044"/>
+          </a:xfrm>
+        </p:spPr>
+      </p:pic>
     </p:spTree>
     <p:extLst>
       <p:ext uri="{BB962C8B-B14F-4D97-AF65-F5344CB8AC3E}">
-        <p14:creationId xmlns:p14="http://schemas.microsoft.com/office/powerpoint/2010/main" val="1581545210"/>
+        <p14:creationId xmlns:p14="http://schemas.microsoft.com/office/powerpoint/2010/main" val="4265485583"/>
       </p:ext>
     </p:extLst>
   </p:cSld>
   <p:clrMapOvr>
     <a:masterClrMapping/>
   </p:clrMapOvr>
+  <p:timing>
+    <p:tnLst>
+      <p:par>
+        <p:cTn id="1" dur="indefinite" restart="never" nodeType="tmRoot"/>
+      </p:par>
+    </p:tnLst>
+  </p:timing>
 </p:sld>
 </file>
 
-<file path=ppt/slides/slide6.xml><?xml version="1.0" encoding="utf-8"?>
+<file path=ppt/slides/slide7.xml><?xml version="1.0" encoding="utf-8"?>
 <p:sld xmlns:a="http://schemas.openxmlformats.org/drawingml/2006/main" xmlns:r="http://schemas.openxmlformats.org/officeDocument/2006/relationships" xmlns:p="http://schemas.openxmlformats.org/presentationml/2006/main">
   <p:cSld>
     <p:spTree>
@@ -4048,7 +6967,7 @@
         <p:spPr>
           <a:xfrm>
             <a:off x="866607" y="201371"/>
-            <a:ext cx="4878238" cy="690024"/>
+            <a:ext cx="8055324" cy="690024"/>
           </a:xfrm>
         </p:spPr>
         <p:txBody>
@@ -4059,92 +6978,17 @@
           <a:p>
             <a:r>
               <a:rPr lang="de-DE" dirty="0"/>
-              <a:t>Dokumentationen</a:t>
-            </a:r>
-          </a:p>
-        </p:txBody>
-      </p:sp>
-      <p:sp>
-        <p:nvSpPr>
-          <p:cNvPr id="3" name="Inhaltsplatzhalter 2"/>
-          <p:cNvSpPr>
-            <a:spLocks noGrp="1"/>
-          </p:cNvSpPr>
-          <p:nvPr>
-            <p:ph idx="1"/>
-          </p:nvPr>
-        </p:nvSpPr>
-        <p:spPr>
-          <a:xfrm>
-            <a:off x="866607" y="1244780"/>
-            <a:ext cx="10515600" cy="4351338"/>
-          </a:xfrm>
-        </p:spPr>
-        <p:txBody>
-          <a:bodyPr/>
-          <a:lstStyle/>
-          <a:p>
-            <a:r>
-              <a:rPr lang="de-DE" dirty="0"/>
-              <a:t>Administratorendokumentation:</a:t>
-            </a:r>
-          </a:p>
-          <a:p>
-            <a:pPr lvl="1"/>
-            <a:r>
-              <a:rPr lang="de-DE" dirty="0"/>
-              <a:t>Wenige Systemvoraussetzungen (Windows, Java 8 oder höher)</a:t>
-            </a:r>
-          </a:p>
-          <a:p>
-            <a:pPr lvl="1"/>
-            <a:r>
-              <a:rPr lang="de-DE" dirty="0"/>
-              <a:t>Verknüpfung oder Ablage der exe-Datei auf dem Desktop</a:t>
-            </a:r>
-          </a:p>
-          <a:p>
-            <a:pPr marL="0" indent="0">
-              <a:buNone/>
-            </a:pPr>
+              <a:t>UML </a:t>
+            </a:r>
+            <a:r>
+              <a:rPr lang="de-DE" dirty="0" smtClean="0"/>
+              <a:t>– </a:t>
+            </a:r>
+            <a:r>
+              <a:rPr lang="de-DE" dirty="0" smtClean="0"/>
+              <a:t>Klassendiagramm</a:t>
+            </a:r>
             <a:endParaRPr lang="de-DE" dirty="0"/>
-          </a:p>
-          <a:p>
-            <a:r>
-              <a:rPr lang="de-DE" dirty="0"/>
-              <a:t>Anwenderdokumentation:</a:t>
-            </a:r>
-          </a:p>
-          <a:p>
-            <a:pPr lvl="1"/>
-            <a:r>
-              <a:rPr lang="de-DE" dirty="0"/>
-              <a:t>Kinder als Nutzer </a:t>
-            </a:r>
-            <a:r>
-              <a:rPr lang="de-DE" dirty="0">
-                <a:sym typeface="Wingdings" panose="05000000000000000000" pitchFamily="2" charset="2"/>
-              </a:rPr>
-              <a:t> entsprechend kinderfreundlich gestaltet</a:t>
-            </a:r>
-          </a:p>
-          <a:p>
-            <a:pPr lvl="1"/>
-            <a:r>
-              <a:rPr lang="de-DE"/>
-              <a:t>Detaillierte </a:t>
-            </a:r>
-            <a:r>
-              <a:rPr lang="de-DE" dirty="0"/>
-              <a:t>Anleitung</a:t>
-            </a:r>
-          </a:p>
-          <a:p>
-            <a:pPr lvl="1"/>
-            <a:r>
-              <a:rPr lang="de-DE" dirty="0"/>
-              <a:t>Kleine Übungsbeispiele mit Lösungen</a:t>
-            </a:r>
           </a:p>
         </p:txBody>
       </p:sp>
@@ -4239,20 +7083,51 @@
           </a:fontRef>
         </p:style>
       </p:cxnSp>
+      <p:pic>
+        <p:nvPicPr>
+          <p:cNvPr id="8" name="Содержимое 3" descr="DezHexKlassendiagramm.png"/>
+          <p:cNvPicPr>
+            <a:picLocks noChangeAspect="1"/>
+          </p:cNvPicPr>
+          <p:nvPr/>
+        </p:nvPicPr>
+        <p:blipFill>
+          <a:blip r:embed="rId3" cstate="print"/>
+          <a:stretch>
+            <a:fillRect/>
+          </a:stretch>
+        </p:blipFill>
+        <p:spPr>
+          <a:xfrm>
+            <a:off x="1524000" y="1063741"/>
+            <a:ext cx="9144000" cy="4995058"/>
+          </a:xfrm>
+          <a:prstGeom prst="rect">
+            <a:avLst/>
+          </a:prstGeom>
+        </p:spPr>
+      </p:pic>
     </p:spTree>
     <p:extLst>
       <p:ext uri="{BB962C8B-B14F-4D97-AF65-F5344CB8AC3E}">
-        <p14:creationId xmlns:p14="http://schemas.microsoft.com/office/powerpoint/2010/main" val="329994621"/>
+        <p14:creationId xmlns:p14="http://schemas.microsoft.com/office/powerpoint/2010/main" val="3292862998"/>
       </p:ext>
     </p:extLst>
   </p:cSld>
   <p:clrMapOvr>
     <a:masterClrMapping/>
   </p:clrMapOvr>
+  <p:timing>
+    <p:tnLst>
+      <p:par>
+        <p:cTn id="1" dur="indefinite" restart="never" nodeType="tmRoot"/>
+      </p:par>
+    </p:tnLst>
+  </p:timing>
 </p:sld>
 </file>
 
-<file path=ppt/slides/slide7.xml><?xml version="1.0" encoding="utf-8"?>
+<file path=ppt/slides/slide8.xml><?xml version="1.0" encoding="utf-8"?>
 <p:sld xmlns:a="http://schemas.openxmlformats.org/drawingml/2006/main" xmlns:r="http://schemas.openxmlformats.org/officeDocument/2006/relationships" xmlns:p="http://schemas.openxmlformats.org/presentationml/2006/main">
   <p:cSld>
     <p:spTree>
@@ -4282,7 +7157,7 @@
         <p:spPr>
           <a:xfrm>
             <a:off x="866607" y="201371"/>
-            <a:ext cx="7564276" cy="690024"/>
+            <a:ext cx="8055324" cy="690024"/>
           </a:xfrm>
         </p:spPr>
         <p:txBody>
@@ -4293,31 +7168,16 @@
           <a:p>
             <a:r>
               <a:rPr lang="de-DE" dirty="0"/>
-              <a:t>Verwendete SWT - Werkezeuge</a:t>
-            </a:r>
-          </a:p>
-        </p:txBody>
-      </p:sp>
-      <p:sp>
-        <p:nvSpPr>
-          <p:cNvPr id="3" name="Inhaltsplatzhalter 2"/>
-          <p:cNvSpPr>
-            <a:spLocks noGrp="1"/>
-          </p:cNvSpPr>
-          <p:nvPr>
-            <p:ph idx="1"/>
-          </p:nvPr>
-        </p:nvSpPr>
-        <p:spPr>
-          <a:xfrm>
-            <a:off x="866607" y="1244780"/>
-            <a:ext cx="10515600" cy="4351338"/>
-          </a:xfrm>
-        </p:spPr>
-        <p:txBody>
-          <a:bodyPr/>
-          <a:lstStyle/>
-          <a:p>
+              <a:t>UML </a:t>
+            </a:r>
+            <a:r>
+              <a:rPr lang="de-DE" dirty="0" smtClean="0"/>
+              <a:t>– </a:t>
+            </a:r>
+            <a:r>
+              <a:rPr lang="de-DE" dirty="0" smtClean="0"/>
+              <a:t>Sequenzdiagramm</a:t>
+            </a:r>
             <a:endParaRPr lang="de-DE" dirty="0"/>
           </a:p>
         </p:txBody>
@@ -4413,20 +7273,50 @@
           </a:fontRef>
         </p:style>
       </p:cxnSp>
+      <p:pic>
+        <p:nvPicPr>
+          <p:cNvPr id="7" name="Содержимое 3" descr="DezHexSequenzdiagramm.png"/>
+          <p:cNvPicPr>
+            <a:picLocks noGrp="1" noChangeAspect="1"/>
+          </p:cNvPicPr>
+          <p:nvPr>
+            <p:ph idx="1"/>
+          </p:nvPr>
+        </p:nvPicPr>
+        <p:blipFill>
+          <a:blip r:embed="rId3" cstate="print"/>
+          <a:stretch>
+            <a:fillRect/>
+          </a:stretch>
+        </p:blipFill>
+        <p:spPr>
+          <a:xfrm>
+            <a:off x="1524000" y="975734"/>
+            <a:ext cx="8114581" cy="5263089"/>
+          </a:xfrm>
+        </p:spPr>
+      </p:pic>
     </p:spTree>
     <p:extLst>
       <p:ext uri="{BB962C8B-B14F-4D97-AF65-F5344CB8AC3E}">
-        <p14:creationId xmlns:p14="http://schemas.microsoft.com/office/powerpoint/2010/main" val="3592684440"/>
+        <p14:creationId xmlns:p14="http://schemas.microsoft.com/office/powerpoint/2010/main" val="1800573294"/>
       </p:ext>
     </p:extLst>
   </p:cSld>
   <p:clrMapOvr>
     <a:masterClrMapping/>
   </p:clrMapOvr>
+  <p:timing>
+    <p:tnLst>
+      <p:par>
+        <p:cTn id="1" dur="indefinite" restart="never" nodeType="tmRoot"/>
+      </p:par>
+    </p:tnLst>
+  </p:timing>
 </p:sld>
 </file>
 
-<file path=ppt/slides/slide8.xml><?xml version="1.0" encoding="utf-8"?>
+<file path=ppt/slides/slide9.xml><?xml version="1.0" encoding="utf-8"?>
 <p:sld xmlns:a="http://schemas.openxmlformats.org/drawingml/2006/main" xmlns:r="http://schemas.openxmlformats.org/officeDocument/2006/relationships" xmlns:p="http://schemas.openxmlformats.org/presentationml/2006/main">
   <p:cSld>
     <p:spTree>
@@ -4456,7 +7346,7 @@
         <p:spPr>
           <a:xfrm>
             <a:off x="866607" y="201371"/>
-            <a:ext cx="6126540" cy="690024"/>
+            <a:ext cx="4878238" cy="690024"/>
           </a:xfrm>
         </p:spPr>
         <p:txBody>
@@ -4467,32 +7357,8 @@
           <a:p>
             <a:r>
               <a:rPr lang="de-DE" dirty="0"/>
-              <a:t>Drittanbieter - Software</a:t>
-            </a:r>
-          </a:p>
-        </p:txBody>
-      </p:sp>
-      <p:sp>
-        <p:nvSpPr>
-          <p:cNvPr id="3" name="Inhaltsplatzhalter 2"/>
-          <p:cNvSpPr>
-            <a:spLocks noGrp="1"/>
-          </p:cNvSpPr>
-          <p:nvPr>
-            <p:ph idx="1"/>
-          </p:nvPr>
-        </p:nvSpPr>
-        <p:spPr>
-          <a:xfrm>
-            <a:off x="866607" y="1244780"/>
-            <a:ext cx="10515600" cy="4351338"/>
-          </a:xfrm>
-        </p:spPr>
-        <p:txBody>
-          <a:bodyPr/>
-          <a:lstStyle/>
-          <a:p>
-            <a:endParaRPr lang="de-DE" dirty="0"/>
+              <a:t>Dokumentationen</a:t>
+            </a:r>
           </a:p>
         </p:txBody>
       </p:sp>
@@ -4587,190 +7453,271 @@
           </a:fontRef>
         </p:style>
       </p:cxnSp>
+      <p:sp>
+        <p:nvSpPr>
+          <p:cNvPr id="7" name="Inhaltsplatzhalter 2"/>
+          <p:cNvSpPr txBox="1">
+            <a:spLocks/>
+          </p:cNvSpPr>
+          <p:nvPr/>
+        </p:nvSpPr>
+        <p:spPr>
+          <a:xfrm>
+            <a:off x="1019007" y="1397180"/>
+            <a:ext cx="10515600" cy="4351338"/>
+          </a:xfrm>
+          <a:prstGeom prst="rect">
+            <a:avLst/>
+          </a:prstGeom>
+        </p:spPr>
+        <p:txBody>
+          <a:bodyPr vert="horz" lIns="91440" tIns="45720" rIns="91440" bIns="45720" rtlCol="0">
+            <a:normAutofit/>
+          </a:bodyPr>
+          <a:lstStyle>
+            <a:lvl1pPr marL="228600" indent="-228600" algn="l" defTabSz="914400" rtl="0" eaLnBrk="1" latinLnBrk="0" hangingPunct="1">
+              <a:lnSpc>
+                <a:spcPct val="90000"/>
+              </a:lnSpc>
+              <a:spcBef>
+                <a:spcPts val="1000"/>
+              </a:spcBef>
+              <a:buFont typeface="Arial" panose="020B0604020202020204" pitchFamily="34" charset="0"/>
+              <a:buChar char="•"/>
+              <a:defRPr sz="2800" kern="1200">
+                <a:solidFill>
+                  <a:schemeClr val="tx1"/>
+                </a:solidFill>
+                <a:latin typeface="+mn-lt"/>
+                <a:ea typeface="+mn-ea"/>
+                <a:cs typeface="+mn-cs"/>
+              </a:defRPr>
+            </a:lvl1pPr>
+            <a:lvl2pPr marL="685800" indent="-228600" algn="l" defTabSz="914400" rtl="0" eaLnBrk="1" latinLnBrk="0" hangingPunct="1">
+              <a:lnSpc>
+                <a:spcPct val="90000"/>
+              </a:lnSpc>
+              <a:spcBef>
+                <a:spcPts val="500"/>
+              </a:spcBef>
+              <a:buFont typeface="Arial" panose="020B0604020202020204" pitchFamily="34" charset="0"/>
+              <a:buChar char="•"/>
+              <a:defRPr sz="2400" kern="1200">
+                <a:solidFill>
+                  <a:schemeClr val="tx1"/>
+                </a:solidFill>
+                <a:latin typeface="+mn-lt"/>
+                <a:ea typeface="+mn-ea"/>
+                <a:cs typeface="+mn-cs"/>
+              </a:defRPr>
+            </a:lvl2pPr>
+            <a:lvl3pPr marL="1143000" indent="-228600" algn="l" defTabSz="914400" rtl="0" eaLnBrk="1" latinLnBrk="0" hangingPunct="1">
+              <a:lnSpc>
+                <a:spcPct val="90000"/>
+              </a:lnSpc>
+              <a:spcBef>
+                <a:spcPts val="500"/>
+              </a:spcBef>
+              <a:buFont typeface="Arial" panose="020B0604020202020204" pitchFamily="34" charset="0"/>
+              <a:buChar char="•"/>
+              <a:defRPr sz="2000" kern="1200">
+                <a:solidFill>
+                  <a:schemeClr val="tx1"/>
+                </a:solidFill>
+                <a:latin typeface="+mn-lt"/>
+                <a:ea typeface="+mn-ea"/>
+                <a:cs typeface="+mn-cs"/>
+              </a:defRPr>
+            </a:lvl3pPr>
+            <a:lvl4pPr marL="1600200" indent="-228600" algn="l" defTabSz="914400" rtl="0" eaLnBrk="1" latinLnBrk="0" hangingPunct="1">
+              <a:lnSpc>
+                <a:spcPct val="90000"/>
+              </a:lnSpc>
+              <a:spcBef>
+                <a:spcPts val="500"/>
+              </a:spcBef>
+              <a:buFont typeface="Arial" panose="020B0604020202020204" pitchFamily="34" charset="0"/>
+              <a:buChar char="•"/>
+              <a:defRPr sz="1800" kern="1200">
+                <a:solidFill>
+                  <a:schemeClr val="tx1"/>
+                </a:solidFill>
+                <a:latin typeface="+mn-lt"/>
+                <a:ea typeface="+mn-ea"/>
+                <a:cs typeface="+mn-cs"/>
+              </a:defRPr>
+            </a:lvl4pPr>
+            <a:lvl5pPr marL="2057400" indent="-228600" algn="l" defTabSz="914400" rtl="0" eaLnBrk="1" latinLnBrk="0" hangingPunct="1">
+              <a:lnSpc>
+                <a:spcPct val="90000"/>
+              </a:lnSpc>
+              <a:spcBef>
+                <a:spcPts val="500"/>
+              </a:spcBef>
+              <a:buFont typeface="Arial" panose="020B0604020202020204" pitchFamily="34" charset="0"/>
+              <a:buChar char="•"/>
+              <a:defRPr sz="1800" kern="1200">
+                <a:solidFill>
+                  <a:schemeClr val="tx1"/>
+                </a:solidFill>
+                <a:latin typeface="+mn-lt"/>
+                <a:ea typeface="+mn-ea"/>
+                <a:cs typeface="+mn-cs"/>
+              </a:defRPr>
+            </a:lvl5pPr>
+            <a:lvl6pPr marL="2514600" indent="-228600" algn="l" defTabSz="914400" rtl="0" eaLnBrk="1" latinLnBrk="0" hangingPunct="1">
+              <a:lnSpc>
+                <a:spcPct val="90000"/>
+              </a:lnSpc>
+              <a:spcBef>
+                <a:spcPts val="500"/>
+              </a:spcBef>
+              <a:buFont typeface="Arial" panose="020B0604020202020204" pitchFamily="34" charset="0"/>
+              <a:buChar char="•"/>
+              <a:defRPr sz="1800" kern="1200">
+                <a:solidFill>
+                  <a:schemeClr val="tx1"/>
+                </a:solidFill>
+                <a:latin typeface="+mn-lt"/>
+                <a:ea typeface="+mn-ea"/>
+                <a:cs typeface="+mn-cs"/>
+              </a:defRPr>
+            </a:lvl6pPr>
+            <a:lvl7pPr marL="2971800" indent="-228600" algn="l" defTabSz="914400" rtl="0" eaLnBrk="1" latinLnBrk="0" hangingPunct="1">
+              <a:lnSpc>
+                <a:spcPct val="90000"/>
+              </a:lnSpc>
+              <a:spcBef>
+                <a:spcPts val="500"/>
+              </a:spcBef>
+              <a:buFont typeface="Arial" panose="020B0604020202020204" pitchFamily="34" charset="0"/>
+              <a:buChar char="•"/>
+              <a:defRPr sz="1800" kern="1200">
+                <a:solidFill>
+                  <a:schemeClr val="tx1"/>
+                </a:solidFill>
+                <a:latin typeface="+mn-lt"/>
+                <a:ea typeface="+mn-ea"/>
+                <a:cs typeface="+mn-cs"/>
+              </a:defRPr>
+            </a:lvl7pPr>
+            <a:lvl8pPr marL="3429000" indent="-228600" algn="l" defTabSz="914400" rtl="0" eaLnBrk="1" latinLnBrk="0" hangingPunct="1">
+              <a:lnSpc>
+                <a:spcPct val="90000"/>
+              </a:lnSpc>
+              <a:spcBef>
+                <a:spcPts val="500"/>
+              </a:spcBef>
+              <a:buFont typeface="Arial" panose="020B0604020202020204" pitchFamily="34" charset="0"/>
+              <a:buChar char="•"/>
+              <a:defRPr sz="1800" kern="1200">
+                <a:solidFill>
+                  <a:schemeClr val="tx1"/>
+                </a:solidFill>
+                <a:latin typeface="+mn-lt"/>
+                <a:ea typeface="+mn-ea"/>
+                <a:cs typeface="+mn-cs"/>
+              </a:defRPr>
+            </a:lvl8pPr>
+            <a:lvl9pPr marL="3886200" indent="-228600" algn="l" defTabSz="914400" rtl="0" eaLnBrk="1" latinLnBrk="0" hangingPunct="1">
+              <a:lnSpc>
+                <a:spcPct val="90000"/>
+              </a:lnSpc>
+              <a:spcBef>
+                <a:spcPts val="500"/>
+              </a:spcBef>
+              <a:buFont typeface="Arial" panose="020B0604020202020204" pitchFamily="34" charset="0"/>
+              <a:buChar char="•"/>
+              <a:defRPr sz="1800" kern="1200">
+                <a:solidFill>
+                  <a:schemeClr val="tx1"/>
+                </a:solidFill>
+                <a:latin typeface="+mn-lt"/>
+                <a:ea typeface="+mn-ea"/>
+                <a:cs typeface="+mn-cs"/>
+              </a:defRPr>
+            </a:lvl9pPr>
+          </a:lstStyle>
+          <a:p>
+            <a:r>
+              <a:rPr lang="de-DE" smtClean="0"/>
+              <a:t>Administratorendokumentation:</a:t>
+            </a:r>
+          </a:p>
+          <a:p>
+            <a:pPr lvl="1"/>
+            <a:r>
+              <a:rPr lang="de-DE" smtClean="0"/>
+              <a:t>Wenige Systemvoraussetzungen (Windows, Java 8 oder höher)</a:t>
+            </a:r>
+          </a:p>
+          <a:p>
+            <a:pPr lvl="1"/>
+            <a:r>
+              <a:rPr lang="de-DE" smtClean="0"/>
+              <a:t>Verknüpfung oder Ablage der exe-Datei auf dem Desktop</a:t>
+            </a:r>
+          </a:p>
+          <a:p>
+            <a:pPr marL="0" indent="0">
+              <a:buFont typeface="Arial" panose="020B0604020202020204" pitchFamily="34" charset="0"/>
+              <a:buNone/>
+            </a:pPr>
+            <a:endParaRPr lang="de-DE" smtClean="0"/>
+          </a:p>
+          <a:p>
+            <a:r>
+              <a:rPr lang="de-DE" smtClean="0"/>
+              <a:t>Anwenderdokumentation:</a:t>
+            </a:r>
+          </a:p>
+          <a:p>
+            <a:pPr lvl="1"/>
+            <a:r>
+              <a:rPr lang="de-DE" smtClean="0"/>
+              <a:t>Kinder als Nutzer </a:t>
+            </a:r>
+            <a:r>
+              <a:rPr lang="de-DE" smtClean="0">
+                <a:sym typeface="Wingdings" panose="05000000000000000000" pitchFamily="2" charset="2"/>
+              </a:rPr>
+              <a:t> entsprechend kinderfreundlich gestaltet</a:t>
+            </a:r>
+          </a:p>
+          <a:p>
+            <a:pPr lvl="1"/>
+            <a:r>
+              <a:rPr lang="de-DE" smtClean="0"/>
+              <a:t>Detaillierte Anleitung</a:t>
+            </a:r>
+          </a:p>
+          <a:p>
+            <a:pPr lvl="1"/>
+            <a:r>
+              <a:rPr lang="de-DE" smtClean="0"/>
+              <a:t>Kleine Übungsbeispiele mit Lösungen</a:t>
+            </a:r>
+            <a:endParaRPr lang="de-DE" dirty="0"/>
+          </a:p>
+        </p:txBody>
+      </p:sp>
     </p:spTree>
     <p:extLst>
       <p:ext uri="{BB962C8B-B14F-4D97-AF65-F5344CB8AC3E}">
-        <p14:creationId xmlns:p14="http://schemas.microsoft.com/office/powerpoint/2010/main" val="1925289598"/>
+        <p14:creationId xmlns:p14="http://schemas.microsoft.com/office/powerpoint/2010/main" val="1581545210"/>
       </p:ext>
     </p:extLst>
   </p:cSld>
   <p:clrMapOvr>
     <a:masterClrMapping/>
   </p:clrMapOvr>
-</p:sld>
-</file>
-
-<file path=ppt/slides/slide9.xml><?xml version="1.0" encoding="utf-8"?>
-<p:sld xmlns:a="http://schemas.openxmlformats.org/drawingml/2006/main" xmlns:r="http://schemas.openxmlformats.org/officeDocument/2006/relationships" xmlns:p="http://schemas.openxmlformats.org/presentationml/2006/main">
-  <p:cSld>
-    <p:spTree>
-      <p:nvGrpSpPr>
-        <p:cNvPr id="1" name=""/>
-        <p:cNvGrpSpPr/>
-        <p:nvPr/>
-      </p:nvGrpSpPr>
-      <p:grpSpPr>
-        <a:xfrm>
-          <a:off x="0" y="0"/>
-          <a:ext cx="0" cy="0"/>
-          <a:chOff x="0" y="0"/>
-          <a:chExt cx="0" cy="0"/>
-        </a:xfrm>
-      </p:grpSpPr>
-      <p:sp>
-        <p:nvSpPr>
-          <p:cNvPr id="2" name="Titel 1"/>
-          <p:cNvSpPr>
-            <a:spLocks noGrp="1"/>
-          </p:cNvSpPr>
-          <p:nvPr>
-            <p:ph type="title"/>
-          </p:nvPr>
-        </p:nvSpPr>
-        <p:spPr>
-          <a:xfrm>
-            <a:off x="866607" y="201371"/>
-            <a:ext cx="6126540" cy="690024"/>
-          </a:xfrm>
-        </p:spPr>
-        <p:txBody>
-          <a:bodyPr>
-            <a:normAutofit fontScale="90000"/>
-          </a:bodyPr>
-          <a:lstStyle/>
-          <a:p>
-            <a:r>
-              <a:rPr lang="de-DE" dirty="0"/>
-              <a:t>Selbstreflektion</a:t>
-            </a:r>
-          </a:p>
-        </p:txBody>
-      </p:sp>
-      <p:sp>
-        <p:nvSpPr>
-          <p:cNvPr id="3" name="Inhaltsplatzhalter 2"/>
-          <p:cNvSpPr>
-            <a:spLocks noGrp="1"/>
-          </p:cNvSpPr>
-          <p:nvPr>
-            <p:ph idx="1"/>
-          </p:nvPr>
-        </p:nvSpPr>
-        <p:spPr>
-          <a:xfrm>
-            <a:off x="866607" y="1244780"/>
-            <a:ext cx="10515600" cy="4351338"/>
-          </a:xfrm>
-        </p:spPr>
-        <p:txBody>
-          <a:bodyPr/>
-          <a:lstStyle/>
-          <a:p>
-            <a:endParaRPr lang="de-DE" dirty="0"/>
-          </a:p>
-        </p:txBody>
-      </p:sp>
-      <p:pic>
-        <p:nvPicPr>
-          <p:cNvPr id="4" name="Grafik 3"/>
-          <p:cNvPicPr>
-            <a:picLocks noChangeAspect="1"/>
-          </p:cNvPicPr>
-          <p:nvPr/>
-        </p:nvPicPr>
-        <p:blipFill>
-          <a:blip r:embed="rId2" cstate="print">
-            <a:extLst>
-              <a:ext uri="{28A0092B-C50C-407E-A947-70E740481C1C}">
-                <a14:useLocalDpi xmlns:a14="http://schemas.microsoft.com/office/drawing/2010/main" val="0"/>
-              </a:ext>
-            </a:extLst>
-          </a:blip>
-          <a:stretch>
-            <a:fillRect/>
-          </a:stretch>
-        </p:blipFill>
-        <p:spPr>
-          <a:xfrm>
-            <a:off x="17595" y="3325"/>
-            <a:ext cx="849012" cy="851140"/>
-          </a:xfrm>
-          <a:prstGeom prst="rect">
-            <a:avLst/>
-          </a:prstGeom>
-          <a:effectLst/>
-        </p:spPr>
-      </p:pic>
-      <p:cxnSp>
-        <p:nvCxnSpPr>
-          <p:cNvPr id="5" name="Gerader Verbinder 4"/>
-          <p:cNvCxnSpPr/>
-          <p:nvPr/>
-        </p:nvCxnSpPr>
-        <p:spPr>
-          <a:xfrm>
-            <a:off x="0" y="879893"/>
-            <a:ext cx="10668000" cy="0"/>
-          </a:xfrm>
-          <a:prstGeom prst="line">
-            <a:avLst/>
-          </a:prstGeom>
-        </p:spPr>
-        <p:style>
-          <a:lnRef idx="3">
-            <a:schemeClr val="accent2"/>
-          </a:lnRef>
-          <a:fillRef idx="0">
-            <a:schemeClr val="accent2"/>
-          </a:fillRef>
-          <a:effectRef idx="2">
-            <a:schemeClr val="accent2"/>
-          </a:effectRef>
-          <a:fontRef idx="minor">
-            <a:schemeClr val="tx1"/>
-          </a:fontRef>
-        </p:style>
-      </p:cxnSp>
-      <p:cxnSp>
-        <p:nvCxnSpPr>
-          <p:cNvPr id="6" name="Gerader Verbinder 5"/>
-          <p:cNvCxnSpPr/>
-          <p:nvPr/>
-        </p:nvCxnSpPr>
-        <p:spPr>
-          <a:xfrm>
-            <a:off x="1524000" y="6311660"/>
-            <a:ext cx="10668000" cy="0"/>
-          </a:xfrm>
-          <a:prstGeom prst="line">
-            <a:avLst/>
-          </a:prstGeom>
-        </p:spPr>
-        <p:style>
-          <a:lnRef idx="3">
-            <a:schemeClr val="accent2"/>
-          </a:lnRef>
-          <a:fillRef idx="0">
-            <a:schemeClr val="accent2"/>
-          </a:fillRef>
-          <a:effectRef idx="2">
-            <a:schemeClr val="accent2"/>
-          </a:effectRef>
-          <a:fontRef idx="minor">
-            <a:schemeClr val="tx1"/>
-          </a:fontRef>
-        </p:style>
-      </p:cxnSp>
-    </p:spTree>
-    <p:extLst>
-      <p:ext uri="{BB962C8B-B14F-4D97-AF65-F5344CB8AC3E}">
-        <p14:creationId xmlns:p14="http://schemas.microsoft.com/office/powerpoint/2010/main" val="4074636198"/>
-      </p:ext>
-    </p:extLst>
-  </p:cSld>
-  <p:clrMapOvr>
-    <a:masterClrMapping/>
-  </p:clrMapOvr>
+  <p:timing>
+    <p:tnLst>
+      <p:par>
+        <p:cTn id="1" dur="indefinite" restart="never" nodeType="tmRoot"/>
+      </p:par>
+    </p:tnLst>
+  </p:timing>
 </p:sld>
 </file>
 
@@ -4817,7 +7764,7 @@
     </a:clrScheme>
     <a:fontScheme name="Office">
       <a:majorFont>
-        <a:latin typeface="Calibri Light" panose="020F0302020204030204"/>
+        <a:latin typeface="Calibri Light"/>
         <a:ea typeface=""/>
         <a:cs typeface=""/>
         <a:font script="Jpan" typeface="ＭＳ Ｐゴシック"/>
@@ -4852,7 +7799,7 @@
         <a:font script="Geor" typeface="Sylfaen"/>
       </a:majorFont>
       <a:minorFont>
-        <a:latin typeface="Calibri" panose="020F0502020204030204"/>
+        <a:latin typeface="Calibri"/>
         <a:ea typeface=""/>
         <a:cs typeface=""/>
         <a:font script="Jpan" typeface="ＭＳ Ｐゴシック"/>

</xml_diff>